<commit_message>
feat(10_conv_layer_backward): update ppt and code
</commit_message>
<xml_diff>
--- a/lessons/10_conv_layer_backward/ppt/卷积层的后向传播推导.pptx
+++ b/lessons/10_conv_layer_backward/ppt/卷积层的后向传播推导.pptx
@@ -5,10 +5,10 @@
     <p:sldMasterId id="2147483648" r:id="rId1"/>
   </p:sldMasterIdLst>
   <p:notesMasterIdLst>
-    <p:notesMasterId r:id="rId38"/>
+    <p:notesMasterId r:id="rId39"/>
   </p:notesMasterIdLst>
   <p:handoutMasterIdLst>
-    <p:handoutMasterId r:id="rId39"/>
+    <p:handoutMasterId r:id="rId40"/>
   </p:handoutMasterIdLst>
   <p:sldIdLst>
     <p:sldId id="307" r:id="rId2"/>
@@ -39,19 +39,20 @@
     <p:sldId id="1151" r:id="rId27"/>
     <p:sldId id="1143" r:id="rId28"/>
     <p:sldId id="1145" r:id="rId29"/>
-    <p:sldId id="537" r:id="rId30"/>
-    <p:sldId id="536" r:id="rId31"/>
-    <p:sldId id="1014" r:id="rId32"/>
-    <p:sldId id="1148" r:id="rId33"/>
-    <p:sldId id="1013" r:id="rId34"/>
-    <p:sldId id="997" r:id="rId35"/>
-    <p:sldId id="998" r:id="rId36"/>
-    <p:sldId id="653" r:id="rId37"/>
+    <p:sldId id="1152" r:id="rId30"/>
+    <p:sldId id="537" r:id="rId31"/>
+    <p:sldId id="536" r:id="rId32"/>
+    <p:sldId id="1014" r:id="rId33"/>
+    <p:sldId id="1148" r:id="rId34"/>
+    <p:sldId id="1013" r:id="rId35"/>
+    <p:sldId id="997" r:id="rId36"/>
+    <p:sldId id="998" r:id="rId37"/>
+    <p:sldId id="653" r:id="rId38"/>
   </p:sldIdLst>
   <p:sldSz cx="12192000" cy="6858000"/>
   <p:notesSz cx="6858000" cy="9144000"/>
   <p:custDataLst>
-    <p:tags r:id="rId40"/>
+    <p:tags r:id="rId41"/>
   </p:custDataLst>
   <p:defaultTextStyle>
     <a:defPPr>
@@ -15152,7 +15153,7 @@
         </p:blipFill>
         <p:spPr>
           <a:xfrm>
-            <a:off x="764265" y="4287950"/>
+            <a:off x="764265" y="4172180"/>
             <a:ext cx="7878958" cy="2044270"/>
           </a:xfrm>
           <a:prstGeom prst="rect">
@@ -15173,6 +15174,175 @@
   <p:clrMapOvr>
     <a:masterClrMapping/>
   </p:clrMapOvr>
+  <p:timing>
+    <p:tnLst>
+      <p:par>
+        <p:cTn id="1" dur="indefinite" restart="never" nodeType="tmRoot">
+          <p:childTnLst>
+            <p:seq concurrent="1" nextAc="seek">
+              <p:cTn id="2" dur="indefinite" nodeType="mainSeq">
+                <p:childTnLst>
+                  <p:par>
+                    <p:cTn id="3" fill="hold">
+                      <p:stCondLst>
+                        <p:cond delay="indefinite"/>
+                      </p:stCondLst>
+                      <p:childTnLst>
+                        <p:par>
+                          <p:cTn id="4" fill="hold">
+                            <p:stCondLst>
+                              <p:cond delay="0"/>
+                            </p:stCondLst>
+                            <p:childTnLst>
+                              <p:par>
+                                <p:cTn id="5" presetID="1" presetClass="entr" presetSubtype="0" fill="hold" nodeType="clickEffect">
+                                  <p:stCondLst>
+                                    <p:cond delay="0"/>
+                                  </p:stCondLst>
+                                  <p:childTnLst>
+                                    <p:set>
+                                      <p:cBhvr>
+                                        <p:cTn id="6" dur="1" fill="hold">
+                                          <p:stCondLst>
+                                            <p:cond delay="0"/>
+                                          </p:stCondLst>
+                                        </p:cTn>
+                                        <p:tgtEl>
+                                          <p:spTgt spid="6">
+                                            <p:txEl>
+                                              <p:pRg st="0" end="0"/>
+                                            </p:txEl>
+                                          </p:spTgt>
+                                        </p:tgtEl>
+                                        <p:attrNameLst>
+                                          <p:attrName>style.visibility</p:attrName>
+                                        </p:attrNameLst>
+                                      </p:cBhvr>
+                                      <p:to>
+                                        <p:strVal val="visible"/>
+                                      </p:to>
+                                    </p:set>
+                                  </p:childTnLst>
+                                </p:cTn>
+                              </p:par>
+                            </p:childTnLst>
+                          </p:cTn>
+                        </p:par>
+                      </p:childTnLst>
+                    </p:cTn>
+                  </p:par>
+                  <p:par>
+                    <p:cTn id="7" fill="hold">
+                      <p:stCondLst>
+                        <p:cond delay="indefinite"/>
+                      </p:stCondLst>
+                      <p:childTnLst>
+                        <p:par>
+                          <p:cTn id="8" fill="hold">
+                            <p:stCondLst>
+                              <p:cond delay="0"/>
+                            </p:stCondLst>
+                            <p:childTnLst>
+                              <p:par>
+                                <p:cTn id="9" presetID="1" presetClass="entr" presetSubtype="0" fill="hold" nodeType="clickEffect">
+                                  <p:stCondLst>
+                                    <p:cond delay="0"/>
+                                  </p:stCondLst>
+                                  <p:childTnLst>
+                                    <p:set>
+                                      <p:cBhvr>
+                                        <p:cTn id="10" dur="1" fill="hold">
+                                          <p:stCondLst>
+                                            <p:cond delay="0"/>
+                                          </p:stCondLst>
+                                        </p:cTn>
+                                        <p:tgtEl>
+                                          <p:spTgt spid="1026"/>
+                                        </p:tgtEl>
+                                        <p:attrNameLst>
+                                          <p:attrName>style.visibility</p:attrName>
+                                        </p:attrNameLst>
+                                      </p:cBhvr>
+                                      <p:to>
+                                        <p:strVal val="visible"/>
+                                      </p:to>
+                                    </p:set>
+                                  </p:childTnLst>
+                                </p:cTn>
+                              </p:par>
+                            </p:childTnLst>
+                          </p:cTn>
+                        </p:par>
+                      </p:childTnLst>
+                    </p:cTn>
+                  </p:par>
+                  <p:par>
+                    <p:cTn id="11" fill="hold">
+                      <p:stCondLst>
+                        <p:cond delay="indefinite"/>
+                      </p:stCondLst>
+                      <p:childTnLst>
+                        <p:par>
+                          <p:cTn id="12" fill="hold">
+                            <p:stCondLst>
+                              <p:cond delay="0"/>
+                            </p:stCondLst>
+                            <p:childTnLst>
+                              <p:par>
+                                <p:cTn id="13" presetID="1" presetClass="entr" presetSubtype="0" fill="hold" nodeType="clickEffect">
+                                  <p:stCondLst>
+                                    <p:cond delay="0"/>
+                                  </p:stCondLst>
+                                  <p:childTnLst>
+                                    <p:set>
+                                      <p:cBhvr>
+                                        <p:cTn id="14" dur="1" fill="hold">
+                                          <p:stCondLst>
+                                            <p:cond delay="0"/>
+                                          </p:stCondLst>
+                                        </p:cTn>
+                                        <p:tgtEl>
+                                          <p:spTgt spid="4"/>
+                                        </p:tgtEl>
+                                        <p:attrNameLst>
+                                          <p:attrName>style.visibility</p:attrName>
+                                        </p:attrNameLst>
+                                      </p:cBhvr>
+                                      <p:to>
+                                        <p:strVal val="visible"/>
+                                      </p:to>
+                                    </p:set>
+                                  </p:childTnLst>
+                                </p:cTn>
+                              </p:par>
+                            </p:childTnLst>
+                          </p:cTn>
+                        </p:par>
+                      </p:childTnLst>
+                    </p:cTn>
+                  </p:par>
+                </p:childTnLst>
+              </p:cTn>
+              <p:prevCondLst>
+                <p:cond evt="onPrev" delay="0">
+                  <p:tgtEl>
+                    <p:sldTgt/>
+                  </p:tgtEl>
+                </p:cond>
+              </p:prevCondLst>
+              <p:nextCondLst>
+                <p:cond evt="onNext" delay="0">
+                  <p:tgtEl>
+                    <p:sldTgt/>
+                  </p:tgtEl>
+                </p:cond>
+              </p:nextCondLst>
+            </p:seq>
+          </p:childTnLst>
+        </p:cTn>
+      </p:par>
+    </p:tnLst>
+  </p:timing>
 </p:sld>
 </file>
 
@@ -15953,6 +16123,269 @@
   <p:clrMapOvr>
     <a:masterClrMapping/>
   </p:clrMapOvr>
+  <p:timing>
+    <p:tnLst>
+      <p:par>
+        <p:cTn id="1" dur="indefinite" restart="never" nodeType="tmRoot">
+          <p:childTnLst>
+            <p:seq concurrent="1" nextAc="seek">
+              <p:cTn id="2" dur="indefinite" nodeType="mainSeq">
+                <p:childTnLst>
+                  <p:par>
+                    <p:cTn id="3" fill="hold">
+                      <p:stCondLst>
+                        <p:cond delay="indefinite"/>
+                      </p:stCondLst>
+                      <p:childTnLst>
+                        <p:par>
+                          <p:cTn id="4" fill="hold">
+                            <p:stCondLst>
+                              <p:cond delay="0"/>
+                            </p:stCondLst>
+                            <p:childTnLst>
+                              <p:par>
+                                <p:cTn id="5" presetID="1" presetClass="entr" presetSubtype="0" fill="hold" nodeType="clickEffect">
+                                  <p:stCondLst>
+                                    <p:cond delay="0"/>
+                                  </p:stCondLst>
+                                  <p:childTnLst>
+                                    <p:set>
+                                      <p:cBhvr>
+                                        <p:cTn id="6" dur="1" fill="hold">
+                                          <p:stCondLst>
+                                            <p:cond delay="0"/>
+                                          </p:stCondLst>
+                                        </p:cTn>
+                                        <p:tgtEl>
+                                          <p:spTgt spid="2"/>
+                                        </p:tgtEl>
+                                        <p:attrNameLst>
+                                          <p:attrName>style.visibility</p:attrName>
+                                        </p:attrNameLst>
+                                      </p:cBhvr>
+                                      <p:to>
+                                        <p:strVal val="visible"/>
+                                      </p:to>
+                                    </p:set>
+                                  </p:childTnLst>
+                                </p:cTn>
+                              </p:par>
+                            </p:childTnLst>
+                          </p:cTn>
+                        </p:par>
+                      </p:childTnLst>
+                    </p:cTn>
+                  </p:par>
+                  <p:par>
+                    <p:cTn id="7" fill="hold">
+                      <p:stCondLst>
+                        <p:cond delay="indefinite"/>
+                      </p:stCondLst>
+                      <p:childTnLst>
+                        <p:par>
+                          <p:cTn id="8" fill="hold">
+                            <p:stCondLst>
+                              <p:cond delay="0"/>
+                            </p:stCondLst>
+                            <p:childTnLst>
+                              <p:par>
+                                <p:cTn id="9" presetID="1" presetClass="entr" presetSubtype="0" fill="hold" nodeType="clickEffect">
+                                  <p:stCondLst>
+                                    <p:cond delay="0"/>
+                                  </p:stCondLst>
+                                  <p:childTnLst>
+                                    <p:set>
+                                      <p:cBhvr>
+                                        <p:cTn id="10" dur="1" fill="hold">
+                                          <p:stCondLst>
+                                            <p:cond delay="0"/>
+                                          </p:stCondLst>
+                                        </p:cTn>
+                                        <p:tgtEl>
+                                          <p:spTgt spid="6">
+                                            <p:txEl>
+                                              <p:pRg st="0" end="0"/>
+                                            </p:txEl>
+                                          </p:spTgt>
+                                        </p:tgtEl>
+                                        <p:attrNameLst>
+                                          <p:attrName>style.visibility</p:attrName>
+                                        </p:attrNameLst>
+                                      </p:cBhvr>
+                                      <p:to>
+                                        <p:strVal val="visible"/>
+                                      </p:to>
+                                    </p:set>
+                                  </p:childTnLst>
+                                </p:cTn>
+                              </p:par>
+                            </p:childTnLst>
+                          </p:cTn>
+                        </p:par>
+                      </p:childTnLst>
+                    </p:cTn>
+                  </p:par>
+                  <p:par>
+                    <p:cTn id="11" fill="hold">
+                      <p:stCondLst>
+                        <p:cond delay="indefinite"/>
+                      </p:stCondLst>
+                      <p:childTnLst>
+                        <p:par>
+                          <p:cTn id="12" fill="hold">
+                            <p:stCondLst>
+                              <p:cond delay="0"/>
+                            </p:stCondLst>
+                            <p:childTnLst>
+                              <p:par>
+                                <p:cTn id="13" presetID="1" presetClass="entr" presetSubtype="0" fill="hold" nodeType="clickEffect">
+                                  <p:stCondLst>
+                                    <p:cond delay="0"/>
+                                  </p:stCondLst>
+                                  <p:childTnLst>
+                                    <p:set>
+                                      <p:cBhvr>
+                                        <p:cTn id="14" dur="1" fill="hold">
+                                          <p:stCondLst>
+                                            <p:cond delay="0"/>
+                                          </p:stCondLst>
+                                        </p:cTn>
+                                        <p:tgtEl>
+                                          <p:spTgt spid="6">
+                                            <p:txEl>
+                                              <p:pRg st="1" end="1"/>
+                                            </p:txEl>
+                                          </p:spTgt>
+                                        </p:tgtEl>
+                                        <p:attrNameLst>
+                                          <p:attrName>style.visibility</p:attrName>
+                                        </p:attrNameLst>
+                                      </p:cBhvr>
+                                      <p:to>
+                                        <p:strVal val="visible"/>
+                                      </p:to>
+                                    </p:set>
+                                  </p:childTnLst>
+                                </p:cTn>
+                              </p:par>
+                            </p:childTnLst>
+                          </p:cTn>
+                        </p:par>
+                      </p:childTnLst>
+                    </p:cTn>
+                  </p:par>
+                  <p:par>
+                    <p:cTn id="15" fill="hold">
+                      <p:stCondLst>
+                        <p:cond delay="indefinite"/>
+                      </p:stCondLst>
+                      <p:childTnLst>
+                        <p:par>
+                          <p:cTn id="16" fill="hold">
+                            <p:stCondLst>
+                              <p:cond delay="0"/>
+                            </p:stCondLst>
+                            <p:childTnLst>
+                              <p:par>
+                                <p:cTn id="17" presetID="1" presetClass="entr" presetSubtype="0" fill="hold" nodeType="clickEffect">
+                                  <p:stCondLst>
+                                    <p:cond delay="0"/>
+                                  </p:stCondLst>
+                                  <p:childTnLst>
+                                    <p:set>
+                                      <p:cBhvr>
+                                        <p:cTn id="18" dur="1" fill="hold">
+                                          <p:stCondLst>
+                                            <p:cond delay="0"/>
+                                          </p:stCondLst>
+                                        </p:cTn>
+                                        <p:tgtEl>
+                                          <p:spTgt spid="5"/>
+                                        </p:tgtEl>
+                                        <p:attrNameLst>
+                                          <p:attrName>style.visibility</p:attrName>
+                                        </p:attrNameLst>
+                                      </p:cBhvr>
+                                      <p:to>
+                                        <p:strVal val="visible"/>
+                                      </p:to>
+                                    </p:set>
+                                  </p:childTnLst>
+                                </p:cTn>
+                              </p:par>
+                            </p:childTnLst>
+                          </p:cTn>
+                        </p:par>
+                      </p:childTnLst>
+                    </p:cTn>
+                  </p:par>
+                  <p:par>
+                    <p:cTn id="19" fill="hold">
+                      <p:stCondLst>
+                        <p:cond delay="indefinite"/>
+                      </p:stCondLst>
+                      <p:childTnLst>
+                        <p:par>
+                          <p:cTn id="20" fill="hold">
+                            <p:stCondLst>
+                              <p:cond delay="0"/>
+                            </p:stCondLst>
+                            <p:childTnLst>
+                              <p:par>
+                                <p:cTn id="21" presetID="1" presetClass="entr" presetSubtype="0" fill="hold" nodeType="clickEffect">
+                                  <p:stCondLst>
+                                    <p:cond delay="0"/>
+                                  </p:stCondLst>
+                                  <p:childTnLst>
+                                    <p:set>
+                                      <p:cBhvr>
+                                        <p:cTn id="22" dur="1" fill="hold">
+                                          <p:stCondLst>
+                                            <p:cond delay="0"/>
+                                          </p:stCondLst>
+                                        </p:cTn>
+                                        <p:tgtEl>
+                                          <p:spTgt spid="8"/>
+                                        </p:tgtEl>
+                                        <p:attrNameLst>
+                                          <p:attrName>style.visibility</p:attrName>
+                                        </p:attrNameLst>
+                                      </p:cBhvr>
+                                      <p:to>
+                                        <p:strVal val="visible"/>
+                                      </p:to>
+                                    </p:set>
+                                  </p:childTnLst>
+                                </p:cTn>
+                              </p:par>
+                            </p:childTnLst>
+                          </p:cTn>
+                        </p:par>
+                      </p:childTnLst>
+                    </p:cTn>
+                  </p:par>
+                </p:childTnLst>
+              </p:cTn>
+              <p:prevCondLst>
+                <p:cond evt="onPrev" delay="0">
+                  <p:tgtEl>
+                    <p:sldTgt/>
+                  </p:tgtEl>
+                </p:cond>
+              </p:prevCondLst>
+              <p:nextCondLst>
+                <p:cond evt="onNext" delay="0">
+                  <p:tgtEl>
+                    <p:sldTgt/>
+                  </p:tgtEl>
+                </p:cond>
+              </p:nextCondLst>
+            </p:seq>
+          </p:childTnLst>
+        </p:cTn>
+      </p:par>
+    </p:tnLst>
+  </p:timing>
 </p:sld>
 </file>
 
@@ -16943,6 +17376,411 @@
   <p:clrMapOvr>
     <a:masterClrMapping/>
   </p:clrMapOvr>
+  <p:timing>
+    <p:tnLst>
+      <p:par>
+        <p:cTn id="1" dur="indefinite" restart="never" nodeType="tmRoot">
+          <p:childTnLst>
+            <p:seq concurrent="1" nextAc="seek">
+              <p:cTn id="2" dur="indefinite" nodeType="mainSeq">
+                <p:childTnLst>
+                  <p:par>
+                    <p:cTn id="3" fill="hold">
+                      <p:stCondLst>
+                        <p:cond delay="indefinite"/>
+                      </p:stCondLst>
+                      <p:childTnLst>
+                        <p:par>
+                          <p:cTn id="4" fill="hold">
+                            <p:stCondLst>
+                              <p:cond delay="0"/>
+                            </p:stCondLst>
+                            <p:childTnLst>
+                              <p:par>
+                                <p:cTn id="5" presetID="1" presetClass="entr" presetSubtype="0" fill="hold" nodeType="clickEffect">
+                                  <p:stCondLst>
+                                    <p:cond delay="0"/>
+                                  </p:stCondLst>
+                                  <p:childTnLst>
+                                    <p:set>
+                                      <p:cBhvr>
+                                        <p:cTn id="6" dur="1" fill="hold">
+                                          <p:stCondLst>
+                                            <p:cond delay="0"/>
+                                          </p:stCondLst>
+                                        </p:cTn>
+                                        <p:tgtEl>
+                                          <p:spTgt spid="2"/>
+                                        </p:tgtEl>
+                                        <p:attrNameLst>
+                                          <p:attrName>style.visibility</p:attrName>
+                                        </p:attrNameLst>
+                                      </p:cBhvr>
+                                      <p:to>
+                                        <p:strVal val="visible"/>
+                                      </p:to>
+                                    </p:set>
+                                  </p:childTnLst>
+                                </p:cTn>
+                              </p:par>
+                            </p:childTnLst>
+                          </p:cTn>
+                        </p:par>
+                      </p:childTnLst>
+                    </p:cTn>
+                  </p:par>
+                  <p:par>
+                    <p:cTn id="7" fill="hold">
+                      <p:stCondLst>
+                        <p:cond delay="indefinite"/>
+                      </p:stCondLst>
+                      <p:childTnLst>
+                        <p:par>
+                          <p:cTn id="8" fill="hold">
+                            <p:stCondLst>
+                              <p:cond delay="0"/>
+                            </p:stCondLst>
+                            <p:childTnLst>
+                              <p:par>
+                                <p:cTn id="9" presetID="1" presetClass="entr" presetSubtype="0" fill="hold" nodeType="clickEffect">
+                                  <p:stCondLst>
+                                    <p:cond delay="0"/>
+                                  </p:stCondLst>
+                                  <p:childTnLst>
+                                    <p:set>
+                                      <p:cBhvr>
+                                        <p:cTn id="10" dur="1" fill="hold">
+                                          <p:stCondLst>
+                                            <p:cond delay="0"/>
+                                          </p:stCondLst>
+                                        </p:cTn>
+                                        <p:tgtEl>
+                                          <p:spTgt spid="6">
+                                            <p:txEl>
+                                              <p:pRg st="0" end="0"/>
+                                            </p:txEl>
+                                          </p:spTgt>
+                                        </p:tgtEl>
+                                        <p:attrNameLst>
+                                          <p:attrName>style.visibility</p:attrName>
+                                        </p:attrNameLst>
+                                      </p:cBhvr>
+                                      <p:to>
+                                        <p:strVal val="visible"/>
+                                      </p:to>
+                                    </p:set>
+                                  </p:childTnLst>
+                                </p:cTn>
+                              </p:par>
+                            </p:childTnLst>
+                          </p:cTn>
+                        </p:par>
+                      </p:childTnLst>
+                    </p:cTn>
+                  </p:par>
+                  <p:par>
+                    <p:cTn id="11" fill="hold">
+                      <p:stCondLst>
+                        <p:cond delay="indefinite"/>
+                      </p:stCondLst>
+                      <p:childTnLst>
+                        <p:par>
+                          <p:cTn id="12" fill="hold">
+                            <p:stCondLst>
+                              <p:cond delay="0"/>
+                            </p:stCondLst>
+                            <p:childTnLst>
+                              <p:par>
+                                <p:cTn id="13" presetID="1" presetClass="entr" presetSubtype="0" fill="hold" nodeType="clickEffect">
+                                  <p:stCondLst>
+                                    <p:cond delay="0"/>
+                                  </p:stCondLst>
+                                  <p:childTnLst>
+                                    <p:set>
+                                      <p:cBhvr>
+                                        <p:cTn id="14" dur="1" fill="hold">
+                                          <p:stCondLst>
+                                            <p:cond delay="0"/>
+                                          </p:stCondLst>
+                                        </p:cTn>
+                                        <p:tgtEl>
+                                          <p:spTgt spid="7"/>
+                                        </p:tgtEl>
+                                        <p:attrNameLst>
+                                          <p:attrName>style.visibility</p:attrName>
+                                        </p:attrNameLst>
+                                      </p:cBhvr>
+                                      <p:to>
+                                        <p:strVal val="visible"/>
+                                      </p:to>
+                                    </p:set>
+                                  </p:childTnLst>
+                                </p:cTn>
+                              </p:par>
+                            </p:childTnLst>
+                          </p:cTn>
+                        </p:par>
+                      </p:childTnLst>
+                    </p:cTn>
+                  </p:par>
+                  <p:par>
+                    <p:cTn id="15" fill="hold">
+                      <p:stCondLst>
+                        <p:cond delay="indefinite"/>
+                      </p:stCondLst>
+                      <p:childTnLst>
+                        <p:par>
+                          <p:cTn id="16" fill="hold">
+                            <p:stCondLst>
+                              <p:cond delay="0"/>
+                            </p:stCondLst>
+                            <p:childTnLst>
+                              <p:par>
+                                <p:cTn id="17" presetID="1" presetClass="entr" presetSubtype="0" fill="hold" nodeType="clickEffect">
+                                  <p:stCondLst>
+                                    <p:cond delay="0"/>
+                                  </p:stCondLst>
+                                  <p:childTnLst>
+                                    <p:set>
+                                      <p:cBhvr>
+                                        <p:cTn id="18" dur="1" fill="hold">
+                                          <p:stCondLst>
+                                            <p:cond delay="0"/>
+                                          </p:stCondLst>
+                                        </p:cTn>
+                                        <p:tgtEl>
+                                          <p:spTgt spid="6">
+                                            <p:txEl>
+                                              <p:pRg st="1" end="1"/>
+                                            </p:txEl>
+                                          </p:spTgt>
+                                        </p:tgtEl>
+                                        <p:attrNameLst>
+                                          <p:attrName>style.visibility</p:attrName>
+                                        </p:attrNameLst>
+                                      </p:cBhvr>
+                                      <p:to>
+                                        <p:strVal val="visible"/>
+                                      </p:to>
+                                    </p:set>
+                                  </p:childTnLst>
+                                </p:cTn>
+                              </p:par>
+                            </p:childTnLst>
+                          </p:cTn>
+                        </p:par>
+                      </p:childTnLst>
+                    </p:cTn>
+                  </p:par>
+                  <p:par>
+                    <p:cTn id="19" fill="hold">
+                      <p:stCondLst>
+                        <p:cond delay="indefinite"/>
+                      </p:stCondLst>
+                      <p:childTnLst>
+                        <p:par>
+                          <p:cTn id="20" fill="hold">
+                            <p:stCondLst>
+                              <p:cond delay="0"/>
+                            </p:stCondLst>
+                            <p:childTnLst>
+                              <p:par>
+                                <p:cTn id="21" presetID="1" presetClass="entr" presetSubtype="0" fill="hold" nodeType="clickEffect">
+                                  <p:stCondLst>
+                                    <p:cond delay="0"/>
+                                  </p:stCondLst>
+                                  <p:childTnLst>
+                                    <p:set>
+                                      <p:cBhvr>
+                                        <p:cTn id="22" dur="1" fill="hold">
+                                          <p:stCondLst>
+                                            <p:cond delay="0"/>
+                                          </p:stCondLst>
+                                        </p:cTn>
+                                        <p:tgtEl>
+                                          <p:spTgt spid="6">
+                                            <p:txEl>
+                                              <p:pRg st="2" end="2"/>
+                                            </p:txEl>
+                                          </p:spTgt>
+                                        </p:tgtEl>
+                                        <p:attrNameLst>
+                                          <p:attrName>style.visibility</p:attrName>
+                                        </p:attrNameLst>
+                                      </p:cBhvr>
+                                      <p:to>
+                                        <p:strVal val="visible"/>
+                                      </p:to>
+                                    </p:set>
+                                  </p:childTnLst>
+                                </p:cTn>
+                              </p:par>
+                            </p:childTnLst>
+                          </p:cTn>
+                        </p:par>
+                      </p:childTnLst>
+                    </p:cTn>
+                  </p:par>
+                  <p:par>
+                    <p:cTn id="23" fill="hold">
+                      <p:stCondLst>
+                        <p:cond delay="indefinite"/>
+                      </p:stCondLst>
+                      <p:childTnLst>
+                        <p:par>
+                          <p:cTn id="24" fill="hold">
+                            <p:stCondLst>
+                              <p:cond delay="0"/>
+                            </p:stCondLst>
+                            <p:childTnLst>
+                              <p:par>
+                                <p:cTn id="25" presetID="1" presetClass="entr" presetSubtype="0" fill="hold" nodeType="clickEffect">
+                                  <p:stCondLst>
+                                    <p:cond delay="0"/>
+                                  </p:stCondLst>
+                                  <p:childTnLst>
+                                    <p:set>
+                                      <p:cBhvr>
+                                        <p:cTn id="26" dur="1" fill="hold">
+                                          <p:stCondLst>
+                                            <p:cond delay="0"/>
+                                          </p:stCondLst>
+                                        </p:cTn>
+                                        <p:tgtEl>
+                                          <p:spTgt spid="10"/>
+                                        </p:tgtEl>
+                                        <p:attrNameLst>
+                                          <p:attrName>style.visibility</p:attrName>
+                                        </p:attrNameLst>
+                                      </p:cBhvr>
+                                      <p:to>
+                                        <p:strVal val="visible"/>
+                                      </p:to>
+                                    </p:set>
+                                  </p:childTnLst>
+                                </p:cTn>
+                              </p:par>
+                            </p:childTnLst>
+                          </p:cTn>
+                        </p:par>
+                      </p:childTnLst>
+                    </p:cTn>
+                  </p:par>
+                  <p:par>
+                    <p:cTn id="27" fill="hold">
+                      <p:stCondLst>
+                        <p:cond delay="indefinite"/>
+                      </p:stCondLst>
+                      <p:childTnLst>
+                        <p:par>
+                          <p:cTn id="28" fill="hold">
+                            <p:stCondLst>
+                              <p:cond delay="0"/>
+                            </p:stCondLst>
+                            <p:childTnLst>
+                              <p:par>
+                                <p:cTn id="29" presetID="1" presetClass="entr" presetSubtype="0" fill="hold" grpId="0" nodeType="clickEffect">
+                                  <p:stCondLst>
+                                    <p:cond delay="0"/>
+                                  </p:stCondLst>
+                                  <p:childTnLst>
+                                    <p:set>
+                                      <p:cBhvr>
+                                        <p:cTn id="30" dur="1" fill="hold">
+                                          <p:stCondLst>
+                                            <p:cond delay="0"/>
+                                          </p:stCondLst>
+                                        </p:cTn>
+                                        <p:tgtEl>
+                                          <p:spTgt spid="11"/>
+                                        </p:tgtEl>
+                                        <p:attrNameLst>
+                                          <p:attrName>style.visibility</p:attrName>
+                                        </p:attrNameLst>
+                                      </p:cBhvr>
+                                      <p:to>
+                                        <p:strVal val="visible"/>
+                                      </p:to>
+                                    </p:set>
+                                  </p:childTnLst>
+                                </p:cTn>
+                              </p:par>
+                            </p:childTnLst>
+                          </p:cTn>
+                        </p:par>
+                      </p:childTnLst>
+                    </p:cTn>
+                  </p:par>
+                  <p:par>
+                    <p:cTn id="31" fill="hold">
+                      <p:stCondLst>
+                        <p:cond delay="indefinite"/>
+                      </p:stCondLst>
+                      <p:childTnLst>
+                        <p:par>
+                          <p:cTn id="32" fill="hold">
+                            <p:stCondLst>
+                              <p:cond delay="0"/>
+                            </p:stCondLst>
+                            <p:childTnLst>
+                              <p:par>
+                                <p:cTn id="33" presetID="1" presetClass="entr" presetSubtype="0" fill="hold" nodeType="clickEffect">
+                                  <p:stCondLst>
+                                    <p:cond delay="0"/>
+                                  </p:stCondLst>
+                                  <p:childTnLst>
+                                    <p:set>
+                                      <p:cBhvr>
+                                        <p:cTn id="34" dur="1" fill="hold">
+                                          <p:stCondLst>
+                                            <p:cond delay="0"/>
+                                          </p:stCondLst>
+                                        </p:cTn>
+                                        <p:tgtEl>
+                                          <p:spTgt spid="4098"/>
+                                        </p:tgtEl>
+                                        <p:attrNameLst>
+                                          <p:attrName>style.visibility</p:attrName>
+                                        </p:attrNameLst>
+                                      </p:cBhvr>
+                                      <p:to>
+                                        <p:strVal val="visible"/>
+                                      </p:to>
+                                    </p:set>
+                                  </p:childTnLst>
+                                </p:cTn>
+                              </p:par>
+                            </p:childTnLst>
+                          </p:cTn>
+                        </p:par>
+                      </p:childTnLst>
+                    </p:cTn>
+                  </p:par>
+                </p:childTnLst>
+              </p:cTn>
+              <p:prevCondLst>
+                <p:cond evt="onPrev" delay="0">
+                  <p:tgtEl>
+                    <p:sldTgt/>
+                  </p:tgtEl>
+                </p:cond>
+              </p:prevCondLst>
+              <p:nextCondLst>
+                <p:cond evt="onNext" delay="0">
+                  <p:tgtEl>
+                    <p:sldTgt/>
+                  </p:tgtEl>
+                </p:cond>
+              </p:nextCondLst>
+            </p:seq>
+          </p:childTnLst>
+        </p:cTn>
+      </p:par>
+    </p:tnLst>
+    <p:bldLst>
+      <p:bldP spid="11" grpId="0"/>
+    </p:bldLst>
+  </p:timing>
 </p:sld>
 </file>
 
@@ -17402,6 +18240,126 @@
   <p:clrMapOvr>
     <a:masterClrMapping/>
   </p:clrMapOvr>
+  <p:timing>
+    <p:tnLst>
+      <p:par>
+        <p:cTn id="1" dur="indefinite" restart="never" nodeType="tmRoot">
+          <p:childTnLst>
+            <p:seq concurrent="1" nextAc="seek">
+              <p:cTn id="2" dur="indefinite" nodeType="mainSeq">
+                <p:childTnLst>
+                  <p:par>
+                    <p:cTn id="3" fill="hold">
+                      <p:stCondLst>
+                        <p:cond delay="indefinite"/>
+                      </p:stCondLst>
+                      <p:childTnLst>
+                        <p:par>
+                          <p:cTn id="4" fill="hold">
+                            <p:stCondLst>
+                              <p:cond delay="0"/>
+                            </p:stCondLst>
+                            <p:childTnLst>
+                              <p:par>
+                                <p:cTn id="5" presetID="1" presetClass="entr" presetSubtype="0" fill="hold" nodeType="clickEffect">
+                                  <p:stCondLst>
+                                    <p:cond delay="0"/>
+                                  </p:stCondLst>
+                                  <p:childTnLst>
+                                    <p:set>
+                                      <p:cBhvr>
+                                        <p:cTn id="6" dur="1" fill="hold">
+                                          <p:stCondLst>
+                                            <p:cond delay="0"/>
+                                          </p:stCondLst>
+                                        </p:cTn>
+                                        <p:tgtEl>
+                                          <p:spTgt spid="7"/>
+                                        </p:tgtEl>
+                                        <p:attrNameLst>
+                                          <p:attrName>style.visibility</p:attrName>
+                                        </p:attrNameLst>
+                                      </p:cBhvr>
+                                      <p:to>
+                                        <p:strVal val="visible"/>
+                                      </p:to>
+                                    </p:set>
+                                  </p:childTnLst>
+                                </p:cTn>
+                              </p:par>
+                            </p:childTnLst>
+                          </p:cTn>
+                        </p:par>
+                      </p:childTnLst>
+                    </p:cTn>
+                  </p:par>
+                  <p:par>
+                    <p:cTn id="7" fill="hold">
+                      <p:stCondLst>
+                        <p:cond delay="indefinite"/>
+                      </p:stCondLst>
+                      <p:childTnLst>
+                        <p:par>
+                          <p:cTn id="8" fill="hold">
+                            <p:stCondLst>
+                              <p:cond delay="0"/>
+                            </p:stCondLst>
+                            <p:childTnLst>
+                              <p:par>
+                                <p:cTn id="9" presetID="1" presetClass="entr" presetSubtype="0" fill="hold" nodeType="clickEffect">
+                                  <p:stCondLst>
+                                    <p:cond delay="0"/>
+                                  </p:stCondLst>
+                                  <p:childTnLst>
+                                    <p:set>
+                                      <p:cBhvr>
+                                        <p:cTn id="10" dur="1" fill="hold">
+                                          <p:stCondLst>
+                                            <p:cond delay="0"/>
+                                          </p:stCondLst>
+                                        </p:cTn>
+                                        <p:tgtEl>
+                                          <p:spTgt spid="9"/>
+                                        </p:tgtEl>
+                                        <p:attrNameLst>
+                                          <p:attrName>style.visibility</p:attrName>
+                                        </p:attrNameLst>
+                                      </p:cBhvr>
+                                      <p:to>
+                                        <p:strVal val="visible"/>
+                                      </p:to>
+                                    </p:set>
+                                  </p:childTnLst>
+                                </p:cTn>
+                              </p:par>
+                            </p:childTnLst>
+                          </p:cTn>
+                        </p:par>
+                      </p:childTnLst>
+                    </p:cTn>
+                  </p:par>
+                </p:childTnLst>
+              </p:cTn>
+              <p:prevCondLst>
+                <p:cond evt="onPrev" delay="0">
+                  <p:tgtEl>
+                    <p:sldTgt/>
+                  </p:tgtEl>
+                </p:cond>
+              </p:prevCondLst>
+              <p:nextCondLst>
+                <p:cond evt="onNext" delay="0">
+                  <p:tgtEl>
+                    <p:sldTgt/>
+                  </p:tgtEl>
+                </p:cond>
+              </p:nextCondLst>
+            </p:seq>
+          </p:childTnLst>
+        </p:cTn>
+      </p:par>
+    </p:tnLst>
+  </p:timing>
 </p:sld>
 </file>
 
@@ -18171,7 +19129,903 @@
                                           </p:stCondLst>
                                         </p:cTn>
                                         <p:tgtEl>
+                                          <p:spTgt spid="6">
+                                            <p:txEl>
+                                              <p:pRg st="0" end="0"/>
+                                            </p:txEl>
+                                          </p:spTgt>
+                                        </p:tgtEl>
+                                        <p:attrNameLst>
+                                          <p:attrName>style.visibility</p:attrName>
+                                        </p:attrNameLst>
+                                      </p:cBhvr>
+                                      <p:to>
+                                        <p:strVal val="visible"/>
+                                      </p:to>
+                                    </p:set>
+                                  </p:childTnLst>
+                                </p:cTn>
+                              </p:par>
+                            </p:childTnLst>
+                          </p:cTn>
+                        </p:par>
+                      </p:childTnLst>
+                    </p:cTn>
+                  </p:par>
+                  <p:par>
+                    <p:cTn id="7" fill="hold">
+                      <p:stCondLst>
+                        <p:cond delay="indefinite"/>
+                      </p:stCondLst>
+                      <p:childTnLst>
+                        <p:par>
+                          <p:cTn id="8" fill="hold">
+                            <p:stCondLst>
+                              <p:cond delay="0"/>
+                            </p:stCondLst>
+                            <p:childTnLst>
+                              <p:par>
+                                <p:cTn id="9" presetID="1" presetClass="entr" presetSubtype="0" fill="hold" nodeType="clickEffect">
+                                  <p:stCondLst>
+                                    <p:cond delay="0"/>
+                                  </p:stCondLst>
+                                  <p:childTnLst>
+                                    <p:set>
+                                      <p:cBhvr>
+                                        <p:cTn id="10" dur="1" fill="hold">
+                                          <p:stCondLst>
+                                            <p:cond delay="0"/>
+                                          </p:stCondLst>
+                                        </p:cTn>
+                                        <p:tgtEl>
                                           <p:spTgt spid="2"/>
+                                        </p:tgtEl>
+                                        <p:attrNameLst>
+                                          <p:attrName>style.visibility</p:attrName>
+                                        </p:attrNameLst>
+                                      </p:cBhvr>
+                                      <p:to>
+                                        <p:strVal val="visible"/>
+                                      </p:to>
+                                    </p:set>
+                                  </p:childTnLst>
+                                </p:cTn>
+                              </p:par>
+                            </p:childTnLst>
+                          </p:cTn>
+                        </p:par>
+                      </p:childTnLst>
+                    </p:cTn>
+                  </p:par>
+                  <p:par>
+                    <p:cTn id="11" fill="hold">
+                      <p:stCondLst>
+                        <p:cond delay="indefinite"/>
+                      </p:stCondLst>
+                      <p:childTnLst>
+                        <p:par>
+                          <p:cTn id="12" fill="hold">
+                            <p:stCondLst>
+                              <p:cond delay="0"/>
+                            </p:stCondLst>
+                            <p:childTnLst>
+                              <p:par>
+                                <p:cTn id="13" presetID="1" presetClass="entr" presetSubtype="0" fill="hold" grpId="0" nodeType="clickEffect">
+                                  <p:stCondLst>
+                                    <p:cond delay="0"/>
+                                  </p:stCondLst>
+                                  <p:childTnLst>
+                                    <p:set>
+                                      <p:cBhvr>
+                                        <p:cTn id="14" dur="1" fill="hold">
+                                          <p:stCondLst>
+                                            <p:cond delay="0"/>
+                                          </p:stCondLst>
+                                        </p:cTn>
+                                        <p:tgtEl>
+                                          <p:spTgt spid="4"/>
+                                        </p:tgtEl>
+                                        <p:attrNameLst>
+                                          <p:attrName>style.visibility</p:attrName>
+                                        </p:attrNameLst>
+                                      </p:cBhvr>
+                                      <p:to>
+                                        <p:strVal val="visible"/>
+                                      </p:to>
+                                    </p:set>
+                                  </p:childTnLst>
+                                </p:cTn>
+                              </p:par>
+                            </p:childTnLst>
+                          </p:cTn>
+                        </p:par>
+                      </p:childTnLst>
+                    </p:cTn>
+                  </p:par>
+                </p:childTnLst>
+              </p:cTn>
+              <p:prevCondLst>
+                <p:cond evt="onPrev" delay="0">
+                  <p:tgtEl>
+                    <p:sldTgt/>
+                  </p:tgtEl>
+                </p:cond>
+              </p:prevCondLst>
+              <p:nextCondLst>
+                <p:cond evt="onNext" delay="0">
+                  <p:tgtEl>
+                    <p:sldTgt/>
+                  </p:tgtEl>
+                </p:cond>
+              </p:nextCondLst>
+            </p:seq>
+          </p:childTnLst>
+        </p:cTn>
+      </p:par>
+    </p:tnLst>
+    <p:bldLst>
+      <p:bldP spid="4" grpId="0"/>
+    </p:bldLst>
+  </p:timing>
+</p:sld>
+</file>
+
+<file path=ppt/slides/slide26.xml><?xml version="1.0" encoding="utf-8"?>
+<p:sld xmlns:a="http://schemas.openxmlformats.org/drawingml/2006/main" xmlns:r="http://schemas.openxmlformats.org/officeDocument/2006/relationships" xmlns:p="http://schemas.openxmlformats.org/presentationml/2006/main">
+  <p:cSld>
+    <p:spTree>
+      <p:nvGrpSpPr>
+        <p:cNvPr id="1" name=""/>
+        <p:cNvGrpSpPr/>
+        <p:nvPr/>
+      </p:nvGrpSpPr>
+      <p:grpSpPr>
+        <a:xfrm>
+          <a:off x="0" y="0"/>
+          <a:ext cx="0" cy="0"/>
+          <a:chOff x="0" y="0"/>
+          <a:chExt cx="0" cy="0"/>
+        </a:xfrm>
+      </p:grpSpPr>
+      <p:sp>
+        <p:nvSpPr>
+          <p:cNvPr id="3" name="标题 2"/>
+          <p:cNvSpPr>
+            <a:spLocks noGrp="1"/>
+          </p:cNvSpPr>
+          <p:nvPr>
+            <p:ph type="title"/>
+          </p:nvPr>
+        </p:nvSpPr>
+        <p:spPr/>
+        <p:txBody>
+          <a:bodyPr/>
+          <a:lstStyle/>
+          <a:p>
+            <a:r>
+              <a:rPr lang="zh-CN" altLang="en-US" dirty="0"/>
+              <a:t>主问题：如何计算</a:t>
+            </a:r>
+            <a:r>
+              <a:rPr kumimoji="1" lang="en-US" altLang="zh-CN" dirty="0">
+                <a:solidFill>
+                  <a:srgbClr val="333333"/>
+                </a:solidFill>
+                <a:latin typeface="verdana" panose="020B0604030504040204" pitchFamily="34" charset="0"/>
+              </a:rPr>
+              <a:t>Filter</a:t>
+            </a:r>
+            <a:r>
+              <a:rPr kumimoji="1" lang="zh-CN" altLang="en-US" dirty="0">
+                <a:solidFill>
+                  <a:srgbClr val="333333"/>
+                </a:solidFill>
+                <a:latin typeface="verdana" panose="020B0604030504040204" pitchFamily="34" charset="0"/>
+              </a:rPr>
+              <a:t>每个权重值的梯度</a:t>
+            </a:r>
+            <a:r>
+              <a:rPr lang="zh-CN" altLang="en-US" dirty="0"/>
+              <a:t>？</a:t>
+            </a:r>
+            <a:endParaRPr dirty="0">
+              <a:sym typeface="+mn-ea"/>
+            </a:endParaRPr>
+          </a:p>
+        </p:txBody>
+      </p:sp>
+      <p:sp>
+        <p:nvSpPr>
+          <p:cNvPr id="6" name="文本占位符 1">
+            <a:extLst>
+              <a:ext uri="{FF2B5EF4-FFF2-40B4-BE49-F238E27FC236}">
+                <a16:creationId xmlns:a16="http://schemas.microsoft.com/office/drawing/2014/main" id="{BA88068A-4FDC-6963-46A5-ADEC46CDA15E}"/>
+              </a:ext>
+            </a:extLst>
+          </p:cNvPr>
+          <p:cNvSpPr txBox="1">
+            <a:spLocks/>
+          </p:cNvSpPr>
+          <p:nvPr/>
+        </p:nvSpPr>
+        <p:spPr>
+          <a:xfrm>
+            <a:off x="822325" y="1778635"/>
+            <a:ext cx="10852150" cy="4553585"/>
+          </a:xfrm>
+        </p:spPr>
+        <p:txBody>
+          <a:bodyPr lIns="101600" tIns="38100" rIns="76200" bIns="38100">
+            <a:noAutofit/>
+          </a:bodyPr>
+          <a:lstStyle>
+            <a:lvl1pPr marL="0" indent="0" algn="l" defTabSz="914400" rtl="0" eaLnBrk="1" fontAlgn="auto" latinLnBrk="0" hangingPunct="1">
+              <a:lnSpc>
+                <a:spcPct val="130000"/>
+              </a:lnSpc>
+              <a:spcBef>
+                <a:spcPts val="0"/>
+              </a:spcBef>
+              <a:spcAft>
+                <a:spcPts val="1000"/>
+              </a:spcAft>
+              <a:buFont typeface="Arial" panose="020B0604020202020204" pitchFamily="34" charset="0"/>
+              <a:buNone/>
+              <a:defRPr kumimoji="0" lang="zh-CN" altLang="en-US" sz="1600" b="0" i="0" u="none" strike="noStrike" kern="1200" cap="none" spc="150" normalizeH="0" baseline="0" noProof="1">
+                <a:solidFill>
+                  <a:schemeClr val="tx1"/>
+                </a:solidFill>
+                <a:uFillTx/>
+                <a:latin typeface="+mn-lt"/>
+                <a:ea typeface="+mn-ea"/>
+                <a:cs typeface="+mn-cs"/>
+                <a:sym typeface="+mn-ea"/>
+              </a:defRPr>
+            </a:lvl1pPr>
+            <a:lvl2pPr marL="457200" indent="0" algn="l" defTabSz="914400" rtl="0" eaLnBrk="1" fontAlgn="auto" latinLnBrk="0" hangingPunct="1">
+              <a:lnSpc>
+                <a:spcPct val="130000"/>
+              </a:lnSpc>
+              <a:spcBef>
+                <a:spcPts val="0"/>
+              </a:spcBef>
+              <a:spcAft>
+                <a:spcPts val="1000"/>
+              </a:spcAft>
+              <a:buFont typeface="Arial" panose="020B0604020202020204" pitchFamily="34" charset="0"/>
+              <a:buNone/>
+              <a:tabLst>
+                <a:tab pos="1609725" algn="l"/>
+              </a:tabLst>
+              <a:defRPr sz="2000" u="none" strike="noStrike" kern="1200" cap="none" spc="150" normalizeH="0" baseline="0">
+                <a:solidFill>
+                  <a:schemeClr val="tx1">
+                    <a:tint val="75000"/>
+                  </a:schemeClr>
+                </a:solidFill>
+                <a:uFillTx/>
+                <a:latin typeface="+mn-lt"/>
+                <a:ea typeface="+mn-ea"/>
+                <a:cs typeface="+mn-cs"/>
+              </a:defRPr>
+            </a:lvl2pPr>
+            <a:lvl3pPr marL="914400" indent="0" algn="l" defTabSz="914400" rtl="0" eaLnBrk="1" fontAlgn="auto" latinLnBrk="0" hangingPunct="1">
+              <a:lnSpc>
+                <a:spcPct val="130000"/>
+              </a:lnSpc>
+              <a:spcBef>
+                <a:spcPts val="0"/>
+              </a:spcBef>
+              <a:spcAft>
+                <a:spcPts val="1000"/>
+              </a:spcAft>
+              <a:buFont typeface="Arial" panose="020B0604020202020204" pitchFamily="34" charset="0"/>
+              <a:buNone/>
+              <a:defRPr sz="1800" u="none" strike="noStrike" kern="1200" cap="none" spc="150" normalizeH="0" baseline="0">
+                <a:solidFill>
+                  <a:schemeClr val="tx1">
+                    <a:tint val="75000"/>
+                  </a:schemeClr>
+                </a:solidFill>
+                <a:uFillTx/>
+                <a:latin typeface="+mn-lt"/>
+                <a:ea typeface="+mn-ea"/>
+                <a:cs typeface="+mn-cs"/>
+              </a:defRPr>
+            </a:lvl3pPr>
+            <a:lvl4pPr marL="1371600" indent="0" algn="l" defTabSz="914400" rtl="0" eaLnBrk="1" fontAlgn="auto" latinLnBrk="0" hangingPunct="1">
+              <a:lnSpc>
+                <a:spcPct val="130000"/>
+              </a:lnSpc>
+              <a:spcBef>
+                <a:spcPts val="0"/>
+              </a:spcBef>
+              <a:spcAft>
+                <a:spcPts val="1000"/>
+              </a:spcAft>
+              <a:buFont typeface="Arial" panose="020B0604020202020204" pitchFamily="34" charset="0"/>
+              <a:buNone/>
+              <a:defRPr sz="1600" u="none" strike="noStrike" kern="1200" cap="none" spc="150" normalizeH="0" baseline="0">
+                <a:solidFill>
+                  <a:schemeClr val="tx1">
+                    <a:tint val="75000"/>
+                  </a:schemeClr>
+                </a:solidFill>
+                <a:uFillTx/>
+                <a:latin typeface="+mn-lt"/>
+                <a:ea typeface="+mn-ea"/>
+                <a:cs typeface="+mn-cs"/>
+              </a:defRPr>
+            </a:lvl4pPr>
+            <a:lvl5pPr marL="1828800" indent="0" algn="l" defTabSz="914400" rtl="0" eaLnBrk="1" fontAlgn="auto" latinLnBrk="0" hangingPunct="1">
+              <a:lnSpc>
+                <a:spcPct val="130000"/>
+              </a:lnSpc>
+              <a:spcBef>
+                <a:spcPts val="0"/>
+              </a:spcBef>
+              <a:spcAft>
+                <a:spcPts val="1000"/>
+              </a:spcAft>
+              <a:buFont typeface="Arial" panose="020B0604020202020204" pitchFamily="34" charset="0"/>
+              <a:buNone/>
+              <a:defRPr sz="1600" u="none" strike="noStrike" kern="1200" cap="none" spc="150" normalizeH="0" baseline="0">
+                <a:solidFill>
+                  <a:schemeClr val="tx1">
+                    <a:tint val="75000"/>
+                  </a:schemeClr>
+                </a:solidFill>
+                <a:uFillTx/>
+                <a:latin typeface="+mn-lt"/>
+                <a:ea typeface="+mn-ea"/>
+                <a:cs typeface="+mn-cs"/>
+              </a:defRPr>
+            </a:lvl5pPr>
+            <a:lvl6pPr marL="2286000" indent="0" algn="l" defTabSz="914400" rtl="0" eaLnBrk="1" latinLnBrk="0" hangingPunct="1">
+              <a:lnSpc>
+                <a:spcPct val="90000"/>
+              </a:lnSpc>
+              <a:spcBef>
+                <a:spcPts val="500"/>
+              </a:spcBef>
+              <a:buFont typeface="Arial" panose="020B0604020202020204" pitchFamily="34" charset="0"/>
+              <a:buNone/>
+              <a:defRPr sz="1600" kern="1200">
+                <a:solidFill>
+                  <a:schemeClr val="tx1">
+                    <a:tint val="75000"/>
+                  </a:schemeClr>
+                </a:solidFill>
+                <a:latin typeface="+mn-lt"/>
+                <a:ea typeface="+mn-ea"/>
+                <a:cs typeface="+mn-cs"/>
+              </a:defRPr>
+            </a:lvl6pPr>
+            <a:lvl7pPr marL="2743200" indent="0" algn="l" defTabSz="914400" rtl="0" eaLnBrk="1" latinLnBrk="0" hangingPunct="1">
+              <a:lnSpc>
+                <a:spcPct val="90000"/>
+              </a:lnSpc>
+              <a:spcBef>
+                <a:spcPts val="500"/>
+              </a:spcBef>
+              <a:buFont typeface="Arial" panose="020B0604020202020204" pitchFamily="34" charset="0"/>
+              <a:buNone/>
+              <a:defRPr sz="1600" kern="1200">
+                <a:solidFill>
+                  <a:schemeClr val="tx1">
+                    <a:tint val="75000"/>
+                  </a:schemeClr>
+                </a:solidFill>
+                <a:latin typeface="+mn-lt"/>
+                <a:ea typeface="+mn-ea"/>
+                <a:cs typeface="+mn-cs"/>
+              </a:defRPr>
+            </a:lvl7pPr>
+            <a:lvl8pPr marL="3200400" indent="0" algn="l" defTabSz="914400" rtl="0" eaLnBrk="1" latinLnBrk="0" hangingPunct="1">
+              <a:lnSpc>
+                <a:spcPct val="90000"/>
+              </a:lnSpc>
+              <a:spcBef>
+                <a:spcPts val="500"/>
+              </a:spcBef>
+              <a:buFont typeface="Arial" panose="020B0604020202020204" pitchFamily="34" charset="0"/>
+              <a:buNone/>
+              <a:defRPr sz="1600" kern="1200">
+                <a:solidFill>
+                  <a:schemeClr val="tx1">
+                    <a:tint val="75000"/>
+                  </a:schemeClr>
+                </a:solidFill>
+                <a:latin typeface="+mn-lt"/>
+                <a:ea typeface="+mn-ea"/>
+                <a:cs typeface="+mn-cs"/>
+              </a:defRPr>
+            </a:lvl8pPr>
+            <a:lvl9pPr marL="3657600" indent="0" algn="l" defTabSz="914400" rtl="0" eaLnBrk="1" latinLnBrk="0" hangingPunct="1">
+              <a:lnSpc>
+                <a:spcPct val="90000"/>
+              </a:lnSpc>
+              <a:spcBef>
+                <a:spcPts val="500"/>
+              </a:spcBef>
+              <a:buFont typeface="Arial" panose="020B0604020202020204" pitchFamily="34" charset="0"/>
+              <a:buNone/>
+              <a:defRPr sz="1600" kern="1200">
+                <a:solidFill>
+                  <a:schemeClr val="tx1">
+                    <a:tint val="75000"/>
+                  </a:schemeClr>
+                </a:solidFill>
+                <a:latin typeface="+mn-lt"/>
+                <a:ea typeface="+mn-ea"/>
+                <a:cs typeface="+mn-cs"/>
+              </a:defRPr>
+            </a:lvl9pPr>
+          </a:lstStyle>
+          <a:p>
+            <a:pPr marL="285750" indent="-285750">
+              <a:buFont typeface="Arial" panose="020B0604020202020204" pitchFamily="34" charset="0"/>
+              <a:buChar char="•"/>
+            </a:pPr>
+            <a:r>
+              <a:rPr lang="zh-CN" altLang="en-US" b="0" i="0" dirty="0">
+                <a:solidFill>
+                  <a:srgbClr val="333333"/>
+                </a:solidFill>
+                <a:effectLst/>
+                <a:latin typeface="PingFang SC" panose="020B0400000000000000" pitchFamily="34" charset="-122"/>
+                <a:ea typeface="PingFang SC" panose="020B0400000000000000" pitchFamily="34" charset="-122"/>
+              </a:rPr>
+              <a:t>对于</a:t>
+            </a:r>
+            <a:r>
+              <a:rPr lang="en-US" altLang="zh-CN" b="0" i="0" dirty="0">
+                <a:solidFill>
+                  <a:srgbClr val="333333"/>
+                </a:solidFill>
+                <a:effectLst/>
+                <a:latin typeface="PingFang SC" panose="020B0400000000000000" pitchFamily="34" charset="-122"/>
+                <a:ea typeface="PingFang SC" panose="020B0400000000000000" pitchFamily="34" charset="-122"/>
+              </a:rPr>
+              <a:t>Filter</a:t>
+            </a:r>
+            <a:r>
+              <a:rPr lang="zh-CN" altLang="en-US" b="0" i="0" dirty="0">
+                <a:solidFill>
+                  <a:srgbClr val="333333"/>
+                </a:solidFill>
+                <a:effectLst/>
+                <a:latin typeface="PingFang SC" panose="020B0400000000000000" pitchFamily="34" charset="-122"/>
+                <a:ea typeface="PingFang SC" panose="020B0400000000000000" pitchFamily="34" charset="-122"/>
+              </a:rPr>
+              <a:t>个数为</a:t>
+            </a:r>
+            <a:r>
+              <a:rPr lang="en-US" altLang="zh-CN" b="0" i="0" dirty="0">
+                <a:solidFill>
+                  <a:srgbClr val="333333"/>
+                </a:solidFill>
+                <a:effectLst/>
+                <a:latin typeface="PingFang SC" panose="020B0400000000000000" pitchFamily="34" charset="-122"/>
+                <a:ea typeface="PingFang SC" panose="020B0400000000000000" pitchFamily="34" charset="-122"/>
+              </a:rPr>
+              <a:t>N</a:t>
+            </a:r>
+            <a:r>
+              <a:rPr lang="zh-CN" altLang="en-US" b="0" i="0" dirty="0">
+                <a:solidFill>
+                  <a:srgbClr val="333333"/>
+                </a:solidFill>
+                <a:effectLst/>
+                <a:latin typeface="PingFang SC" panose="020B0400000000000000" pitchFamily="34" charset="-122"/>
+                <a:ea typeface="PingFang SC" panose="020B0400000000000000" pitchFamily="34" charset="-122"/>
+              </a:rPr>
+              <a:t>和每个</a:t>
+            </a:r>
+            <a:r>
+              <a:rPr lang="en-US" altLang="zh-CN" b="0" i="0" dirty="0">
+                <a:solidFill>
+                  <a:srgbClr val="333333"/>
+                </a:solidFill>
+                <a:effectLst/>
+                <a:latin typeface="PingFang SC" panose="020B0400000000000000" pitchFamily="34" charset="-122"/>
+                <a:ea typeface="PingFang SC" panose="020B0400000000000000" pitchFamily="34" charset="-122"/>
+              </a:rPr>
+              <a:t>Filter</a:t>
+            </a:r>
+            <a:r>
+              <a:rPr lang="zh-CN" altLang="en-US" b="0" i="0" dirty="0">
+                <a:solidFill>
+                  <a:srgbClr val="333333"/>
+                </a:solidFill>
+                <a:effectLst/>
+                <a:latin typeface="PingFang SC" panose="020B0400000000000000" pitchFamily="34" charset="-122"/>
+                <a:ea typeface="PingFang SC" panose="020B0400000000000000" pitchFamily="34" charset="-122"/>
+              </a:rPr>
+              <a:t>的深度为</a:t>
+            </a:r>
+            <a:r>
+              <a:rPr lang="en-US" altLang="zh-CN" b="0" i="0" dirty="0">
+                <a:solidFill>
+                  <a:srgbClr val="333333"/>
+                </a:solidFill>
+                <a:effectLst/>
+                <a:latin typeface="PingFang SC" panose="020B0400000000000000" pitchFamily="34" charset="-122"/>
+                <a:ea typeface="PingFang SC" panose="020B0400000000000000" pitchFamily="34" charset="-122"/>
+              </a:rPr>
+              <a:t>D</a:t>
+            </a:r>
+            <a:r>
+              <a:rPr lang="zh-CN" altLang="en-US" b="0" i="0" dirty="0">
+                <a:solidFill>
+                  <a:srgbClr val="333333"/>
+                </a:solidFill>
+                <a:effectLst/>
+                <a:latin typeface="PingFang SC" panose="020B0400000000000000" pitchFamily="34" charset="-122"/>
+                <a:ea typeface="PingFang SC" panose="020B0400000000000000" pitchFamily="34" charset="-122"/>
+              </a:rPr>
+              <a:t>的情况，因为</a:t>
+            </a:r>
+            <a:r>
+              <a:rPr lang="zh-CN" altLang="en-US" b="0" i="0" dirty="0">
+                <a:solidFill>
+                  <a:srgbClr val="121212"/>
+                </a:solidFill>
+                <a:effectLst/>
+                <a:latin typeface="-apple-system"/>
+              </a:rPr>
+              <a:t>每个都对应输出图像的对应深度的</a:t>
+            </a:r>
+            <a:r>
+              <a:rPr lang="en-US" altLang="zh-CN" b="0" i="0" dirty="0">
+                <a:solidFill>
+                  <a:srgbClr val="121212"/>
+                </a:solidFill>
+                <a:effectLst/>
+                <a:latin typeface="-apple-system"/>
+              </a:rPr>
+              <a:t>Feature map</a:t>
+            </a:r>
+            <a:r>
+              <a:rPr lang="zh-CN" altLang="en-US" b="0" i="0" dirty="0">
+                <a:solidFill>
+                  <a:srgbClr val="121212"/>
+                </a:solidFill>
+                <a:effectLst/>
+                <a:latin typeface="-apple-system"/>
+              </a:rPr>
+              <a:t>和输入图像的对应深度的</a:t>
+            </a:r>
+            <a:r>
+              <a:rPr lang="en-US" altLang="zh-CN" b="0" i="0" dirty="0">
+                <a:solidFill>
+                  <a:srgbClr val="121212"/>
+                </a:solidFill>
+                <a:effectLst/>
+                <a:latin typeface="-apple-system"/>
+              </a:rPr>
+              <a:t>Feature map</a:t>
+            </a:r>
+            <a:r>
+              <a:rPr lang="zh-CN" altLang="en-US" b="0" i="0" dirty="0">
+                <a:solidFill>
+                  <a:srgbClr val="121212"/>
+                </a:solidFill>
+                <a:effectLst/>
+                <a:latin typeface="-apple-system"/>
+              </a:rPr>
+              <a:t>，每一个二维</a:t>
+            </a:r>
+            <a:r>
+              <a:rPr lang="en-US" altLang="zh-CN" b="0" i="0" dirty="0">
+                <a:solidFill>
+                  <a:srgbClr val="121212"/>
+                </a:solidFill>
+                <a:effectLst/>
+                <a:latin typeface="-apple-system"/>
+              </a:rPr>
+              <a:t>Filter</a:t>
+            </a:r>
+            <a:r>
+              <a:rPr lang="zh-CN" altLang="en-US" b="0" i="0" dirty="0">
+                <a:solidFill>
+                  <a:srgbClr val="121212"/>
+                </a:solidFill>
+                <a:effectLst/>
+                <a:latin typeface="-apple-system"/>
+              </a:rPr>
+              <a:t>只涉及到一次二维卷积运算</a:t>
+            </a:r>
+            <a:endParaRPr lang="en-US" altLang="zh-CN" b="0" i="0" dirty="0">
+              <a:solidFill>
+                <a:srgbClr val="121212"/>
+              </a:solidFill>
+              <a:effectLst/>
+              <a:latin typeface="-apple-system"/>
+            </a:endParaRPr>
+          </a:p>
+          <a:p>
+            <a:pPr marL="285750" indent="-285750">
+              <a:buFont typeface="Arial" panose="020B0604020202020204" pitchFamily="34" charset="0"/>
+              <a:buChar char="•"/>
+            </a:pPr>
+            <a:r>
+              <a:rPr lang="zh-CN" altLang="en-US" dirty="0">
+                <a:solidFill>
+                  <a:srgbClr val="121212"/>
+                </a:solidFill>
+                <a:latin typeface="-apple-system"/>
+              </a:rPr>
+              <a:t>所以只需分别计算</a:t>
+            </a:r>
+            <a:r>
+              <a:rPr lang="en-US" altLang="zh-CN" dirty="0">
+                <a:solidFill>
+                  <a:srgbClr val="121212"/>
+                </a:solidFill>
+                <a:latin typeface="-apple-system"/>
+              </a:rPr>
+              <a:t>N×D</a:t>
+            </a:r>
+            <a:r>
+              <a:rPr lang="zh-CN" altLang="en-US" dirty="0">
+                <a:solidFill>
+                  <a:srgbClr val="121212"/>
+                </a:solidFill>
+                <a:latin typeface="-apple-system"/>
+              </a:rPr>
+              <a:t>次</a:t>
+            </a:r>
+            <a:r>
+              <a:rPr lang="zh-CN" altLang="en-US" b="0" i="0" dirty="0">
+                <a:solidFill>
+                  <a:srgbClr val="121212"/>
+                </a:solidFill>
+                <a:effectLst/>
+                <a:latin typeface="-apple-system"/>
+              </a:rPr>
+              <a:t>每个二维</a:t>
+            </a:r>
+            <a:r>
+              <a:rPr lang="en-US" altLang="zh-CN" b="0" i="0" dirty="0">
+                <a:solidFill>
+                  <a:srgbClr val="121212"/>
+                </a:solidFill>
+                <a:effectLst/>
+                <a:latin typeface="-apple-system"/>
+              </a:rPr>
+              <a:t>Filter</a:t>
+            </a:r>
+            <a:r>
+              <a:rPr lang="zh-CN" altLang="en-US" b="0" i="0" dirty="0">
+                <a:solidFill>
+                  <a:srgbClr val="121212"/>
+                </a:solidFill>
+                <a:effectLst/>
+                <a:latin typeface="-apple-system"/>
+              </a:rPr>
+              <a:t>的导数，再将其组合成</a:t>
+            </a:r>
+            <a:r>
+              <a:rPr lang="en-US" altLang="zh-CN" b="0" i="0" dirty="0">
+                <a:solidFill>
+                  <a:srgbClr val="121212"/>
+                </a:solidFill>
+                <a:effectLst/>
+                <a:latin typeface="-apple-system"/>
+              </a:rPr>
+              <a:t>4</a:t>
+            </a:r>
+            <a:r>
+              <a:rPr lang="zh-CN" altLang="en-US" b="0" i="0" dirty="0">
+                <a:solidFill>
+                  <a:srgbClr val="121212"/>
+                </a:solidFill>
+                <a:effectLst/>
+                <a:latin typeface="-apple-system"/>
+              </a:rPr>
+              <a:t>维张量</a:t>
+            </a:r>
+            <a:r>
+              <a:rPr lang="zh-CN" altLang="en-US" dirty="0">
+                <a:solidFill>
+                  <a:srgbClr val="121212"/>
+                </a:solidFill>
+                <a:latin typeface="-apple-system"/>
+              </a:rPr>
+              <a:t>，</a:t>
+            </a:r>
+            <a:r>
+              <a:rPr lang="zh-CN" altLang="en-US" b="0" i="0" dirty="0">
+                <a:solidFill>
+                  <a:srgbClr val="121212"/>
+                </a:solidFill>
+                <a:effectLst/>
+                <a:latin typeface="-apple-system"/>
+              </a:rPr>
+              <a:t>即可求得整个</a:t>
+            </a:r>
+            <a:r>
+              <a:rPr lang="en-US" altLang="zh-CN" b="0" i="0" dirty="0">
+                <a:solidFill>
+                  <a:srgbClr val="121212"/>
+                </a:solidFill>
+                <a:effectLst/>
+                <a:latin typeface="-apple-system"/>
+              </a:rPr>
+              <a:t>Filter</a:t>
+            </a:r>
+            <a:r>
+              <a:rPr lang="zh-CN" altLang="en-US" b="0" i="0" dirty="0">
+                <a:solidFill>
+                  <a:srgbClr val="121212"/>
+                </a:solidFill>
+                <a:effectLst/>
+                <a:latin typeface="-apple-system"/>
+              </a:rPr>
+              <a:t>的导数</a:t>
+            </a:r>
+            <a:endParaRPr lang="zh-CN" altLang="en-US" dirty="0"/>
+          </a:p>
+          <a:p>
+            <a:pPr marL="285750" indent="-285750">
+              <a:buFont typeface="Arial" panose="020B0604020202020204" pitchFamily="34" charset="0"/>
+              <a:buChar char="•"/>
+            </a:pPr>
+            <a:endParaRPr lang="en-US" altLang="zh-CN" dirty="0"/>
+          </a:p>
+          <a:p>
+            <a:pPr marL="285750" indent="-285750">
+              <a:buFont typeface="Arial" panose="020B0604020202020204" pitchFamily="34" charset="0"/>
+              <a:buChar char="•"/>
+            </a:pPr>
+            <a:endParaRPr lang="zh-CN" altLang="en-US" dirty="0"/>
+          </a:p>
+          <a:p>
+            <a:pPr marL="285750" indent="-285750">
+              <a:buFont typeface="Arial" panose="020B0604020202020204" pitchFamily="34" charset="0"/>
+              <a:buChar char="•"/>
+            </a:pPr>
+            <a:endParaRPr lang="zh-CN" altLang="en-US" dirty="0"/>
+          </a:p>
+          <a:p>
+            <a:pPr marL="285750" indent="-285750">
+              <a:buFont typeface="Arial" panose="020B0604020202020204" pitchFamily="34" charset="0"/>
+              <a:buChar char="•"/>
+            </a:pPr>
+            <a:endParaRPr lang="zh-CN" altLang="en-US" dirty="0"/>
+          </a:p>
+          <a:p>
+            <a:pPr marL="285750" indent="-285750">
+              <a:buFont typeface="Arial" panose="020B0604020202020204" pitchFamily="34" charset="0"/>
+              <a:buChar char="•"/>
+            </a:pPr>
+            <a:endParaRPr lang="zh-CN" altLang="en-US" dirty="0"/>
+          </a:p>
+          <a:p>
+            <a:pPr marL="285750" indent="-285750">
+              <a:buFont typeface="Arial" panose="020B0604020202020204" pitchFamily="34" charset="0"/>
+              <a:buChar char="•"/>
+            </a:pPr>
+            <a:endParaRPr lang="zh-CN" altLang="en-US" dirty="0"/>
+          </a:p>
+          <a:p>
+            <a:pPr marL="285750" indent="-285750">
+              <a:buFont typeface="Arial" panose="020B0604020202020204" pitchFamily="34" charset="0"/>
+              <a:buChar char="•"/>
+            </a:pPr>
+            <a:endParaRPr lang="zh-CN" altLang="en-US" dirty="0"/>
+          </a:p>
+          <a:p>
+            <a:pPr marL="285750" indent="-285750">
+              <a:buFont typeface="Arial" panose="020B0604020202020204" pitchFamily="34" charset="0"/>
+              <a:buChar char="•"/>
+            </a:pPr>
+            <a:endParaRPr lang="zh-CN" altLang="en-US" dirty="0"/>
+          </a:p>
+        </p:txBody>
+      </p:sp>
+    </p:spTree>
+    <p:custDataLst>
+      <p:tags r:id="rId1"/>
+    </p:custDataLst>
+    <p:extLst>
+      <p:ext uri="{BB962C8B-B14F-4D97-AF65-F5344CB8AC3E}">
+        <p14:creationId xmlns:p14="http://schemas.microsoft.com/office/powerpoint/2010/main" val="3298517590"/>
+      </p:ext>
+    </p:extLst>
+  </p:cSld>
+  <p:clrMapOvr>
+    <a:masterClrMapping/>
+  </p:clrMapOvr>
+  <p:timing>
+    <p:tnLst>
+      <p:par>
+        <p:cTn id="1" dur="indefinite" restart="never" nodeType="tmRoot">
+          <p:childTnLst>
+            <p:seq concurrent="1" nextAc="seek">
+              <p:cTn id="2" dur="indefinite" nodeType="mainSeq">
+                <p:childTnLst>
+                  <p:par>
+                    <p:cTn id="3" fill="hold">
+                      <p:stCondLst>
+                        <p:cond delay="indefinite"/>
+                      </p:stCondLst>
+                      <p:childTnLst>
+                        <p:par>
+                          <p:cTn id="4" fill="hold">
+                            <p:stCondLst>
+                              <p:cond delay="0"/>
+                            </p:stCondLst>
+                            <p:childTnLst>
+                              <p:par>
+                                <p:cTn id="5" presetID="1" presetClass="entr" presetSubtype="0" fill="hold" nodeType="clickEffect">
+                                  <p:stCondLst>
+                                    <p:cond delay="0"/>
+                                  </p:stCondLst>
+                                  <p:childTnLst>
+                                    <p:set>
+                                      <p:cBhvr>
+                                        <p:cTn id="6" dur="1" fill="hold">
+                                          <p:stCondLst>
+                                            <p:cond delay="0"/>
+                                          </p:stCondLst>
+                                        </p:cTn>
+                                        <p:tgtEl>
+                                          <p:spTgt spid="6">
+                                            <p:txEl>
+                                              <p:pRg st="0" end="0"/>
+                                            </p:txEl>
+                                          </p:spTgt>
+                                        </p:tgtEl>
+                                        <p:attrNameLst>
+                                          <p:attrName>style.visibility</p:attrName>
+                                        </p:attrNameLst>
+                                      </p:cBhvr>
+                                      <p:to>
+                                        <p:strVal val="visible"/>
+                                      </p:to>
+                                    </p:set>
+                                  </p:childTnLst>
+                                </p:cTn>
+                              </p:par>
+                            </p:childTnLst>
+                          </p:cTn>
+                        </p:par>
+                      </p:childTnLst>
+                    </p:cTn>
+                  </p:par>
+                  <p:par>
+                    <p:cTn id="7" fill="hold">
+                      <p:stCondLst>
+                        <p:cond delay="indefinite"/>
+                      </p:stCondLst>
+                      <p:childTnLst>
+                        <p:par>
+                          <p:cTn id="8" fill="hold">
+                            <p:stCondLst>
+                              <p:cond delay="0"/>
+                            </p:stCondLst>
+                            <p:childTnLst>
+                              <p:par>
+                                <p:cTn id="9" presetID="1" presetClass="entr" presetSubtype="0" fill="hold" nodeType="clickEffect">
+                                  <p:stCondLst>
+                                    <p:cond delay="0"/>
+                                  </p:stCondLst>
+                                  <p:childTnLst>
+                                    <p:set>
+                                      <p:cBhvr>
+                                        <p:cTn id="10" dur="1" fill="hold">
+                                          <p:stCondLst>
+                                            <p:cond delay="0"/>
+                                          </p:stCondLst>
+                                        </p:cTn>
+                                        <p:tgtEl>
+                                          <p:spTgt spid="6">
+                                            <p:txEl>
+                                              <p:pRg st="1" end="1"/>
+                                            </p:txEl>
+                                          </p:spTgt>
                                         </p:tgtEl>
                                         <p:attrNameLst>
                                           <p:attrName>style.visibility</p:attrName>
@@ -18215,7 +20069,7 @@
 </p:sld>
 </file>
 
-<file path=ppt/slides/slide26.xml><?xml version="1.0" encoding="utf-8"?>
+<file path=ppt/slides/slide27.xml><?xml version="1.0" encoding="utf-8"?>
 <p:sld xmlns:a="http://schemas.openxmlformats.org/drawingml/2006/main" xmlns:r="http://schemas.openxmlformats.org/officeDocument/2006/relationships" xmlns:p="http://schemas.openxmlformats.org/presentationml/2006/main">
   <p:cSld>
     <p:spTree>
@@ -18249,29 +20103,7 @@
           <a:p>
             <a:r>
               <a:rPr lang="zh-CN" altLang="en-US" dirty="0"/>
-              <a:t>主问题：如何计算</a:t>
-            </a:r>
-            <a:r>
-              <a:rPr kumimoji="1" lang="en-US" altLang="zh-CN" dirty="0">
-                <a:solidFill>
-                  <a:srgbClr val="333333"/>
-                </a:solidFill>
-                <a:latin typeface="verdana" panose="020B0604030504040204" pitchFamily="34" charset="0"/>
-              </a:rPr>
-              <a:t>Filter</a:t>
-            </a:r>
-            <a:r>
-              <a:rPr kumimoji="1" lang="zh-CN" altLang="en-US" dirty="0">
-                <a:solidFill>
-                  <a:srgbClr val="333333"/>
-                </a:solidFill>
-                <a:latin typeface="verdana" panose="020B0604030504040204" pitchFamily="34" charset="0"/>
-              </a:rPr>
-              <a:t>每个权重值的梯度</a:t>
-            </a:r>
-            <a:r>
-              <a:rPr lang="zh-CN" altLang="en-US" dirty="0"/>
-              <a:t>？</a:t>
+              <a:t>结学</a:t>
             </a:r>
             <a:endParaRPr dirty="0">
               <a:sym typeface="+mn-ea"/>
@@ -18513,280 +20345,55 @@
               <a:buChar char="•"/>
             </a:pPr>
             <a:r>
-              <a:rPr lang="zh-CN" altLang="en-US" b="0" i="0" dirty="0">
+              <a:rPr lang="zh-CN" altLang="en-US" dirty="0"/>
+              <a:t>如何计算</a:t>
+            </a:r>
+            <a:r>
+              <a:rPr kumimoji="1" lang="en-US" altLang="zh-CN" dirty="0">
                 <a:solidFill>
                   <a:srgbClr val="333333"/>
                 </a:solidFill>
-                <a:effectLst/>
-                <a:latin typeface="PingFang SC" panose="020B0400000000000000" pitchFamily="34" charset="-122"/>
-                <a:ea typeface="PingFang SC" panose="020B0400000000000000" pitchFamily="34" charset="-122"/>
-              </a:rPr>
-              <a:t>对于</a:t>
-            </a:r>
-            <a:r>
-              <a:rPr lang="en-US" altLang="zh-CN" b="0" i="0" dirty="0">
-                <a:solidFill>
-                  <a:srgbClr val="333333"/>
-                </a:solidFill>
-                <a:effectLst/>
-                <a:latin typeface="PingFang SC" panose="020B0400000000000000" pitchFamily="34" charset="-122"/>
-                <a:ea typeface="PingFang SC" panose="020B0400000000000000" pitchFamily="34" charset="-122"/>
+                <a:latin typeface="verdana" panose="020B0604030504040204" pitchFamily="34" charset="0"/>
               </a:rPr>
               <a:t>Filter</a:t>
             </a:r>
             <a:r>
-              <a:rPr lang="zh-CN" altLang="en-US" b="0" i="0" dirty="0">
+              <a:rPr kumimoji="1" lang="zh-CN" altLang="en-US" dirty="0">
                 <a:solidFill>
                   <a:srgbClr val="333333"/>
                 </a:solidFill>
-                <a:effectLst/>
-                <a:latin typeface="PingFang SC" panose="020B0400000000000000" pitchFamily="34" charset="-122"/>
-                <a:ea typeface="PingFang SC" panose="020B0400000000000000" pitchFamily="34" charset="-122"/>
+                <a:latin typeface="verdana" panose="020B0604030504040204" pitchFamily="34" charset="0"/>
               </a:rPr>
-              <a:t>个数为</a:t>
-            </a:r>
-            <a:r>
-              <a:rPr lang="en-US" altLang="zh-CN" b="0" i="0" dirty="0">
-                <a:solidFill>
-                  <a:srgbClr val="333333"/>
-                </a:solidFill>
-                <a:effectLst/>
-                <a:latin typeface="PingFang SC" panose="020B0400000000000000" pitchFamily="34" charset="-122"/>
-                <a:ea typeface="PingFang SC" panose="020B0400000000000000" pitchFamily="34" charset="-122"/>
-              </a:rPr>
-              <a:t>N</a:t>
-            </a:r>
-            <a:r>
-              <a:rPr lang="zh-CN" altLang="en-US" b="0" i="0" dirty="0">
-                <a:solidFill>
-                  <a:srgbClr val="333333"/>
-                </a:solidFill>
-                <a:effectLst/>
-                <a:latin typeface="PingFang SC" panose="020B0400000000000000" pitchFamily="34" charset="-122"/>
-                <a:ea typeface="PingFang SC" panose="020B0400000000000000" pitchFamily="34" charset="-122"/>
-              </a:rPr>
-              <a:t>和每个</a:t>
-            </a:r>
-            <a:r>
-              <a:rPr lang="en-US" altLang="zh-CN" b="0" i="0" dirty="0">
-                <a:solidFill>
-                  <a:srgbClr val="333333"/>
-                </a:solidFill>
-                <a:effectLst/>
-                <a:latin typeface="PingFang SC" panose="020B0400000000000000" pitchFamily="34" charset="-122"/>
-                <a:ea typeface="PingFang SC" panose="020B0400000000000000" pitchFamily="34" charset="-122"/>
-              </a:rPr>
-              <a:t>Filter</a:t>
-            </a:r>
-            <a:r>
-              <a:rPr lang="zh-CN" altLang="en-US" b="0" i="0" dirty="0">
-                <a:solidFill>
-                  <a:srgbClr val="333333"/>
-                </a:solidFill>
-                <a:effectLst/>
-                <a:latin typeface="PingFang SC" panose="020B0400000000000000" pitchFamily="34" charset="-122"/>
-                <a:ea typeface="PingFang SC" panose="020B0400000000000000" pitchFamily="34" charset="-122"/>
-              </a:rPr>
-              <a:t>的深度为</a:t>
-            </a:r>
-            <a:r>
-              <a:rPr lang="en-US" altLang="zh-CN" b="0" i="0" dirty="0">
-                <a:solidFill>
-                  <a:srgbClr val="333333"/>
-                </a:solidFill>
-                <a:effectLst/>
-                <a:latin typeface="PingFang SC" panose="020B0400000000000000" pitchFamily="34" charset="-122"/>
-                <a:ea typeface="PingFang SC" panose="020B0400000000000000" pitchFamily="34" charset="-122"/>
-              </a:rPr>
-              <a:t>D</a:t>
-            </a:r>
-            <a:r>
-              <a:rPr lang="zh-CN" altLang="en-US" b="0" i="0" dirty="0">
-                <a:solidFill>
-                  <a:srgbClr val="333333"/>
-                </a:solidFill>
-                <a:effectLst/>
-                <a:latin typeface="PingFang SC" panose="020B0400000000000000" pitchFamily="34" charset="-122"/>
-                <a:ea typeface="PingFang SC" panose="020B0400000000000000" pitchFamily="34" charset="-122"/>
-              </a:rPr>
-              <a:t>的情况，因为</a:t>
-            </a:r>
-            <a:r>
-              <a:rPr lang="zh-CN" altLang="en-US" b="0" i="0" dirty="0">
-                <a:solidFill>
-                  <a:srgbClr val="121212"/>
-                </a:solidFill>
-                <a:effectLst/>
-                <a:latin typeface="-apple-system"/>
-              </a:rPr>
-              <a:t>每个都对应输出图像的对应深度的</a:t>
-            </a:r>
-            <a:r>
-              <a:rPr lang="en-US" altLang="zh-CN" b="0" i="0" dirty="0">
-                <a:solidFill>
-                  <a:srgbClr val="121212"/>
-                </a:solidFill>
-                <a:effectLst/>
-                <a:latin typeface="-apple-system"/>
-              </a:rPr>
-              <a:t>Feature map</a:t>
-            </a:r>
-            <a:r>
-              <a:rPr lang="zh-CN" altLang="en-US" b="0" i="0" dirty="0">
-                <a:solidFill>
-                  <a:srgbClr val="121212"/>
-                </a:solidFill>
-                <a:effectLst/>
-                <a:latin typeface="-apple-system"/>
-              </a:rPr>
-              <a:t>和输入图像的对应深度的</a:t>
-            </a:r>
-            <a:r>
-              <a:rPr lang="en-US" altLang="zh-CN" b="0" i="0" dirty="0">
-                <a:solidFill>
-                  <a:srgbClr val="121212"/>
-                </a:solidFill>
-                <a:effectLst/>
-                <a:latin typeface="-apple-system"/>
-              </a:rPr>
-              <a:t>Feature map</a:t>
-            </a:r>
-            <a:r>
-              <a:rPr lang="zh-CN" altLang="en-US" b="0" i="0" dirty="0">
-                <a:solidFill>
-                  <a:srgbClr val="121212"/>
-                </a:solidFill>
-                <a:effectLst/>
-                <a:latin typeface="-apple-system"/>
-              </a:rPr>
-              <a:t>，每一个二维</a:t>
-            </a:r>
-            <a:r>
-              <a:rPr lang="en-US" altLang="zh-CN" b="0" i="0" dirty="0">
-                <a:solidFill>
-                  <a:srgbClr val="121212"/>
-                </a:solidFill>
-                <a:effectLst/>
-                <a:latin typeface="-apple-system"/>
-              </a:rPr>
-              <a:t>Filter</a:t>
-            </a:r>
-            <a:r>
-              <a:rPr lang="zh-CN" altLang="en-US" b="0" i="0" dirty="0">
-                <a:solidFill>
-                  <a:srgbClr val="121212"/>
-                </a:solidFill>
-                <a:effectLst/>
-                <a:latin typeface="-apple-system"/>
-              </a:rPr>
-              <a:t>只涉及到一次二维卷积运算</a:t>
-            </a:r>
-            <a:endParaRPr lang="en-US" altLang="zh-CN" b="0" i="0" dirty="0">
-              <a:solidFill>
-                <a:srgbClr val="121212"/>
-              </a:solidFill>
-              <a:effectLst/>
-              <a:latin typeface="-apple-system"/>
-            </a:endParaRPr>
+              <a:t>每个权重值的梯度</a:t>
+            </a:r>
+            <a:r>
+              <a:rPr lang="zh-CN" altLang="en-US" dirty="0"/>
+              <a:t>？</a:t>
+            </a:r>
+            <a:endParaRPr lang="en-US" altLang="zh-CN" dirty="0"/>
           </a:p>
           <a:p>
             <a:pPr marL="285750" indent="-285750">
               <a:buFont typeface="Arial" panose="020B0604020202020204" pitchFamily="34" charset="0"/>
               <a:buChar char="•"/>
             </a:pPr>
-            <a:r>
-              <a:rPr lang="zh-CN" altLang="en-US" b="0" i="0" dirty="0">
-                <a:solidFill>
-                  <a:srgbClr val="121212"/>
-                </a:solidFill>
-                <a:effectLst/>
-                <a:latin typeface="-apple-system"/>
-              </a:rPr>
-              <a:t>那求得整个卷积核的导数，只需分析</a:t>
-            </a:r>
-            <a:r>
-              <a:rPr lang="en-US" altLang="zh-CN" b="0" i="0" dirty="0">
-                <a:solidFill>
-                  <a:srgbClr val="121212"/>
-                </a:solidFill>
-                <a:effectLst/>
-                <a:latin typeface="-apple-system"/>
-              </a:rPr>
-              <a:t>N×D</a:t>
-            </a:r>
-            <a:r>
-              <a:rPr lang="zh-CN" altLang="en-US" b="0" i="0" dirty="0">
-                <a:solidFill>
-                  <a:srgbClr val="121212"/>
-                </a:solidFill>
-                <a:effectLst/>
-                <a:latin typeface="-apple-system"/>
-              </a:rPr>
-              <a:t>次二维</a:t>
-            </a:r>
-            <a:r>
-              <a:rPr lang="en-US" altLang="zh-CN" b="0" i="0" dirty="0">
-                <a:solidFill>
-                  <a:srgbClr val="121212"/>
-                </a:solidFill>
-                <a:effectLst/>
-                <a:latin typeface="-apple-system"/>
-              </a:rPr>
-              <a:t>Filter</a:t>
-            </a:r>
-            <a:r>
-              <a:rPr lang="zh-CN" altLang="en-US" b="0" i="0" dirty="0">
-                <a:solidFill>
-                  <a:srgbClr val="121212"/>
-                </a:solidFill>
-                <a:effectLst/>
-                <a:latin typeface="-apple-system"/>
-              </a:rPr>
-              <a:t>中每个二维</a:t>
-            </a:r>
-            <a:r>
-              <a:rPr lang="en-US" altLang="zh-CN" b="0" i="0" dirty="0">
-                <a:solidFill>
-                  <a:srgbClr val="121212"/>
-                </a:solidFill>
-                <a:effectLst/>
-                <a:latin typeface="-apple-system"/>
-              </a:rPr>
-              <a:t>Filter</a:t>
-            </a:r>
-            <a:r>
-              <a:rPr lang="zh-CN" altLang="en-US" b="0" i="0" dirty="0">
-                <a:solidFill>
-                  <a:srgbClr val="121212"/>
-                </a:solidFill>
-                <a:effectLst/>
-                <a:latin typeface="-apple-system"/>
-              </a:rPr>
-              <a:t>的导数，再将其组合成</a:t>
-            </a:r>
-            <a:r>
-              <a:rPr lang="en-US" altLang="zh-CN" b="0" i="0" dirty="0">
-                <a:solidFill>
-                  <a:srgbClr val="121212"/>
-                </a:solidFill>
-                <a:effectLst/>
-                <a:latin typeface="-apple-system"/>
-              </a:rPr>
-              <a:t>4</a:t>
-            </a:r>
-            <a:r>
-              <a:rPr lang="zh-CN" altLang="en-US" b="0" i="0" dirty="0">
-                <a:solidFill>
-                  <a:srgbClr val="121212"/>
-                </a:solidFill>
-                <a:effectLst/>
-                <a:latin typeface="-apple-system"/>
-              </a:rPr>
-              <a:t>维张量即可</a:t>
-            </a:r>
             <a:endParaRPr lang="en-US" altLang="zh-CN" dirty="0"/>
           </a:p>
           <a:p>
+            <a:pPr marL="285750" indent="-285750">
+              <a:buFont typeface="Arial" panose="020B0604020202020204" pitchFamily="34" charset="0"/>
+              <a:buChar char="•"/>
+            </a:pPr>
+            <a:r>
+              <a:rPr lang="zh-CN" altLang="en-US" dirty="0"/>
+              <a:t>自学、展学</a:t>
+            </a:r>
+          </a:p>
+          <a:p>
+            <a:pPr marL="285750" indent="-285750">
+              <a:buFont typeface="Arial" panose="020B0604020202020204" pitchFamily="34" charset="0"/>
+              <a:buChar char="•"/>
+            </a:pPr>
             <a:endParaRPr lang="zh-CN" altLang="en-US" dirty="0"/>
           </a:p>
           <a:p>
@@ -18853,7 +20460,166 @@
     </p:custDataLst>
     <p:extLst>
       <p:ext uri="{BB962C8B-B14F-4D97-AF65-F5344CB8AC3E}">
-        <p14:creationId xmlns:p14="http://schemas.microsoft.com/office/powerpoint/2010/main" val="3298517590"/>
+        <p14:creationId xmlns:p14="http://schemas.microsoft.com/office/powerpoint/2010/main" val="519778867"/>
+      </p:ext>
+    </p:extLst>
+  </p:cSld>
+  <p:clrMapOvr>
+    <a:masterClrMapping/>
+  </p:clrMapOvr>
+  <p:timing>
+    <p:tnLst>
+      <p:par>
+        <p:cTn id="1" dur="indefinite" restart="never" nodeType="tmRoot">
+          <p:childTnLst>
+            <p:seq concurrent="1" nextAc="seek">
+              <p:cTn id="2" dur="indefinite" nodeType="mainSeq">
+                <p:childTnLst>
+                  <p:par>
+                    <p:cTn id="3" fill="hold">
+                      <p:stCondLst>
+                        <p:cond delay="indefinite"/>
+                      </p:stCondLst>
+                      <p:childTnLst>
+                        <p:par>
+                          <p:cTn id="4" fill="hold">
+                            <p:stCondLst>
+                              <p:cond delay="0"/>
+                            </p:stCondLst>
+                            <p:childTnLst>
+                              <p:par>
+                                <p:cTn id="5" presetID="1" presetClass="entr" presetSubtype="0" fill="hold" nodeType="clickEffect">
+                                  <p:stCondLst>
+                                    <p:cond delay="0"/>
+                                  </p:stCondLst>
+                                  <p:childTnLst>
+                                    <p:set>
+                                      <p:cBhvr>
+                                        <p:cTn id="6" dur="1" fill="hold">
+                                          <p:stCondLst>
+                                            <p:cond delay="0"/>
+                                          </p:stCondLst>
+                                        </p:cTn>
+                                        <p:tgtEl>
+                                          <p:spTgt spid="6">
+                                            <p:txEl>
+                                              <p:pRg st="0" end="0"/>
+                                            </p:txEl>
+                                          </p:spTgt>
+                                        </p:tgtEl>
+                                        <p:attrNameLst>
+                                          <p:attrName>style.visibility</p:attrName>
+                                        </p:attrNameLst>
+                                      </p:cBhvr>
+                                      <p:to>
+                                        <p:strVal val="visible"/>
+                                      </p:to>
+                                    </p:set>
+                                  </p:childTnLst>
+                                </p:cTn>
+                              </p:par>
+                            </p:childTnLst>
+                          </p:cTn>
+                        </p:par>
+                      </p:childTnLst>
+                    </p:cTn>
+                  </p:par>
+                </p:childTnLst>
+              </p:cTn>
+              <p:prevCondLst>
+                <p:cond evt="onPrev" delay="0">
+                  <p:tgtEl>
+                    <p:sldTgt/>
+                  </p:tgtEl>
+                </p:cond>
+              </p:prevCondLst>
+              <p:nextCondLst>
+                <p:cond evt="onNext" delay="0">
+                  <p:tgtEl>
+                    <p:sldTgt/>
+                  </p:tgtEl>
+                </p:cond>
+              </p:nextCondLst>
+            </p:seq>
+          </p:childTnLst>
+        </p:cTn>
+      </p:par>
+    </p:tnLst>
+  </p:timing>
+</p:sld>
+</file>
+
+<file path=ppt/slides/slide28.xml><?xml version="1.0" encoding="utf-8"?>
+<p:sld xmlns:a="http://schemas.openxmlformats.org/drawingml/2006/main" xmlns:r="http://schemas.openxmlformats.org/officeDocument/2006/relationships" xmlns:p="http://schemas.openxmlformats.org/presentationml/2006/main">
+  <p:cSld>
+    <p:spTree>
+      <p:nvGrpSpPr>
+        <p:cNvPr id="1" name=""/>
+        <p:cNvGrpSpPr/>
+        <p:nvPr/>
+      </p:nvGrpSpPr>
+      <p:grpSpPr>
+        <a:xfrm>
+          <a:off x="0" y="0"/>
+          <a:ext cx="0" cy="0"/>
+          <a:chOff x="0" y="0"/>
+          <a:chExt cx="0" cy="0"/>
+        </a:xfrm>
+      </p:grpSpPr>
+      <p:sp>
+        <p:nvSpPr>
+          <p:cNvPr id="2" name="标题 1"/>
+          <p:cNvSpPr>
+            <a:spLocks noGrp="1"/>
+          </p:cNvSpPr>
+          <p:nvPr>
+            <p:ph type="title"/>
+          </p:nvPr>
+        </p:nvSpPr>
+        <p:spPr/>
+        <p:txBody>
+          <a:bodyPr/>
+          <a:lstStyle/>
+          <a:p>
+            <a:r>
+              <a:rPr lang="zh-CN" altLang="en-US" dirty="0">
+                <a:sym typeface="+mn-ea"/>
+              </a:rPr>
+              <a:t>任务：实现</a:t>
+            </a:r>
+            <a:r>
+              <a:rPr lang="zh-CN" altLang="en-US" dirty="0"/>
+              <a:t>计算</a:t>
+            </a:r>
+            <a:r>
+              <a:rPr kumimoji="1" lang="en-US" altLang="zh-CN" dirty="0">
+                <a:solidFill>
+                  <a:srgbClr val="333333"/>
+                </a:solidFill>
+                <a:latin typeface="verdana" panose="020B0604030504040204" pitchFamily="34" charset="0"/>
+              </a:rPr>
+              <a:t>Filter</a:t>
+            </a:r>
+            <a:r>
+              <a:rPr kumimoji="1" lang="zh-CN" altLang="en-US" dirty="0">
+                <a:solidFill>
+                  <a:srgbClr val="333333"/>
+                </a:solidFill>
+                <a:latin typeface="verdana" panose="020B0604030504040204" pitchFamily="34" charset="0"/>
+              </a:rPr>
+              <a:t>每个权重值的梯度</a:t>
+            </a:r>
+            <a:endParaRPr lang="en-US" altLang="zh-CN" dirty="0"/>
+          </a:p>
+        </p:txBody>
+      </p:sp>
+    </p:spTree>
+    <p:custDataLst>
+      <p:tags r:id="rId1"/>
+    </p:custDataLst>
+    <p:extLst>
+      <p:ext uri="{BB962C8B-B14F-4D97-AF65-F5344CB8AC3E}">
+        <p14:creationId xmlns:p14="http://schemas.microsoft.com/office/powerpoint/2010/main" val="3375828254"/>
       </p:ext>
     </p:extLst>
   </p:cSld>
@@ -18863,7 +20629,7 @@
 </p:sld>
 </file>
 
-<file path=ppt/slides/slide27.xml><?xml version="1.0" encoding="utf-8"?>
+<file path=ppt/slides/slide29.xml><?xml version="1.0" encoding="utf-8"?>
 <p:sld xmlns:a="http://schemas.openxmlformats.org/drawingml/2006/main" xmlns:r="http://schemas.openxmlformats.org/officeDocument/2006/relationships" xmlns:p="http://schemas.openxmlformats.org/presentationml/2006/main">
   <p:cSld>
     <p:spTree>
@@ -18896,8 +20662,14 @@
           <a:lstStyle/>
           <a:p>
             <a:r>
+              <a:rPr lang="zh-CN" altLang="en-US" dirty="0">
+                <a:sym typeface="+mn-ea"/>
+              </a:rPr>
+              <a:t>任务：实现</a:t>
+            </a:r>
+            <a:r>
               <a:rPr lang="zh-CN" altLang="en-US" dirty="0"/>
-              <a:t>主问题：如何计算</a:t>
+              <a:t>计算</a:t>
             </a:r>
             <a:r>
               <a:rPr kumimoji="1" lang="en-US" altLang="zh-CN" dirty="0">
@@ -18916,10 +20688,6 @@
                 <a:latin typeface="verdana" panose="020B0604030504040204" pitchFamily="34" charset="0"/>
               </a:rPr>
               <a:t>每个权重值的梯度</a:t>
-            </a:r>
-            <a:r>
-              <a:rPr lang="zh-CN" altLang="en-US" dirty="0"/>
-              <a:t>？</a:t>
             </a:r>
             <a:endParaRPr dirty="0">
               <a:sym typeface="+mn-ea"/>
@@ -19161,25 +20929,44 @@
               <a:buChar char="•"/>
             </a:pPr>
             <a:r>
-              <a:rPr lang="en-US" altLang="zh-CN" dirty="0"/>
-              <a:t>TODO</a:t>
-            </a:r>
+              <a:rPr lang="zh-CN" altLang="en-US" dirty="0"/>
+              <a:t>请实现计算</a:t>
+            </a:r>
+            <a:r>
+              <a:rPr kumimoji="1" lang="en-US" altLang="zh-CN" dirty="0">
+                <a:solidFill>
+                  <a:srgbClr val="333333"/>
+                </a:solidFill>
+                <a:latin typeface="verdana" panose="020B0604030504040204" pitchFamily="34" charset="0"/>
+              </a:rPr>
+              <a:t>Filter</a:t>
+            </a:r>
+            <a:r>
+              <a:rPr kumimoji="1" lang="zh-CN" altLang="en-US" dirty="0">
+                <a:solidFill>
+                  <a:srgbClr val="333333"/>
+                </a:solidFill>
+                <a:latin typeface="verdana" panose="020B0604030504040204" pitchFamily="34" charset="0"/>
+              </a:rPr>
+              <a:t>每个权重值的梯度</a:t>
+            </a:r>
+            <a:r>
+              <a:rPr lang="zh-CN" altLang="en-US" dirty="0"/>
+              <a:t>？</a:t>
+            </a:r>
+            <a:endParaRPr lang="en-US" altLang="zh-CN" dirty="0"/>
+          </a:p>
+          <a:p>
+            <a:endParaRPr lang="en-US" altLang="zh-CN" dirty="0"/>
           </a:p>
           <a:p>
             <a:pPr marL="285750" indent="-285750">
               <a:buFont typeface="Arial" panose="020B0604020202020204" pitchFamily="34" charset="0"/>
               <a:buChar char="•"/>
             </a:pPr>
-            <a:endParaRPr lang="en-US" altLang="zh-CN" dirty="0"/>
-          </a:p>
-          <a:p>
-            <a:pPr marL="285750" indent="-285750">
-              <a:buFont typeface="Arial" panose="020B0604020202020204" pitchFamily="34" charset="0"/>
-              <a:buChar char="•"/>
-            </a:pPr>
             <a:r>
               <a:rPr lang="zh-CN" altLang="en-US" dirty="0"/>
-              <a:t>自学、互学、展学</a:t>
+              <a:t>自学、展学</a:t>
             </a:r>
           </a:p>
           <a:p>
@@ -19253,143 +21040,92 @@
     </p:custDataLst>
     <p:extLst>
       <p:ext uri="{BB962C8B-B14F-4D97-AF65-F5344CB8AC3E}">
-        <p14:creationId xmlns:p14="http://schemas.microsoft.com/office/powerpoint/2010/main" val="519778867"/>
+        <p14:creationId xmlns:p14="http://schemas.microsoft.com/office/powerpoint/2010/main" val="3719186030"/>
       </p:ext>
     </p:extLst>
   </p:cSld>
   <p:clrMapOvr>
     <a:masterClrMapping/>
   </p:clrMapOvr>
-</p:sld>
-</file>
-
-<file path=ppt/slides/slide28.xml><?xml version="1.0" encoding="utf-8"?>
-<p:sld xmlns:a="http://schemas.openxmlformats.org/drawingml/2006/main" xmlns:r="http://schemas.openxmlformats.org/officeDocument/2006/relationships" xmlns:p="http://schemas.openxmlformats.org/presentationml/2006/main">
-  <p:cSld>
-    <p:spTree>
-      <p:nvGrpSpPr>
-        <p:cNvPr id="1" name=""/>
-        <p:cNvGrpSpPr/>
-        <p:nvPr/>
-      </p:nvGrpSpPr>
-      <p:grpSpPr>
-        <a:xfrm>
-          <a:off x="0" y="0"/>
-          <a:ext cx="0" cy="0"/>
-          <a:chOff x="0" y="0"/>
-          <a:chExt cx="0" cy="0"/>
-        </a:xfrm>
-      </p:grpSpPr>
-      <p:sp>
-        <p:nvSpPr>
-          <p:cNvPr id="2" name="标题 1"/>
-          <p:cNvSpPr>
-            <a:spLocks noGrp="1"/>
-          </p:cNvSpPr>
-          <p:nvPr>
-            <p:ph type="title"/>
-          </p:nvPr>
-        </p:nvSpPr>
-        <p:spPr/>
-        <p:txBody>
-          <a:bodyPr/>
-          <a:lstStyle/>
-          <a:p>
-            <a:r>
-              <a:rPr lang="zh-CN" altLang="en-US" dirty="0">
-                <a:sym typeface="+mn-ea"/>
-              </a:rPr>
-              <a:t>任务：实现</a:t>
-            </a:r>
-            <a:r>
-              <a:rPr lang="zh-CN" altLang="en-US" dirty="0"/>
-              <a:t>计算</a:t>
-            </a:r>
-            <a:r>
-              <a:rPr kumimoji="1" lang="en-US" altLang="zh-CN" dirty="0">
-                <a:solidFill>
-                  <a:srgbClr val="333333"/>
-                </a:solidFill>
-                <a:latin typeface="verdana" panose="020B0604030504040204" pitchFamily="34" charset="0"/>
-              </a:rPr>
-              <a:t>Filter</a:t>
-            </a:r>
-            <a:r>
-              <a:rPr kumimoji="1" lang="zh-CN" altLang="en-US" dirty="0">
-                <a:solidFill>
-                  <a:srgbClr val="333333"/>
-                </a:solidFill>
-                <a:latin typeface="verdana" panose="020B0604030504040204" pitchFamily="34" charset="0"/>
-              </a:rPr>
-              <a:t>每个权重值的梯度</a:t>
-            </a:r>
-            <a:endParaRPr lang="en-US" altLang="zh-CN" dirty="0"/>
-          </a:p>
-        </p:txBody>
-      </p:sp>
-    </p:spTree>
-    <p:custDataLst>
-      <p:tags r:id="rId1"/>
-    </p:custDataLst>
-    <p:extLst>
-      <p:ext uri="{BB962C8B-B14F-4D97-AF65-F5344CB8AC3E}">
-        <p14:creationId xmlns:p14="http://schemas.microsoft.com/office/powerpoint/2010/main" val="3375828254"/>
-      </p:ext>
-    </p:extLst>
-  </p:cSld>
-  <p:clrMapOvr>
-    <a:masterClrMapping/>
-  </p:clrMapOvr>
-</p:sld>
-</file>
-
-<file path=ppt/slides/slide29.xml><?xml version="1.0" encoding="utf-8"?>
-<p:sld xmlns:a="http://schemas.openxmlformats.org/drawingml/2006/main" xmlns:r="http://schemas.openxmlformats.org/officeDocument/2006/relationships" xmlns:p="http://schemas.openxmlformats.org/presentationml/2006/main">
-  <p:cSld>
-    <p:spTree>
-      <p:nvGrpSpPr>
-        <p:cNvPr id="1" name=""/>
-        <p:cNvGrpSpPr/>
-        <p:nvPr/>
-      </p:nvGrpSpPr>
-      <p:grpSpPr>
-        <a:xfrm>
-          <a:off x="0" y="0"/>
-          <a:ext cx="0" cy="0"/>
-          <a:chOff x="0" y="0"/>
-          <a:chExt cx="0" cy="0"/>
-        </a:xfrm>
-      </p:grpSpPr>
-      <p:sp>
-        <p:nvSpPr>
-          <p:cNvPr id="2" name="标题 1"/>
-          <p:cNvSpPr>
-            <a:spLocks noGrp="1"/>
-          </p:cNvSpPr>
-          <p:nvPr>
-            <p:ph type="title"/>
-          </p:nvPr>
-        </p:nvSpPr>
-        <p:spPr/>
-        <p:txBody>
-          <a:bodyPr/>
-          <a:lstStyle/>
-          <a:p>
-            <a:r>
-              <a:rPr lang="zh-CN" altLang="en-US"/>
-              <a:t>总结</a:t>
-            </a:r>
-          </a:p>
-        </p:txBody>
-      </p:sp>
-    </p:spTree>
-    <p:custDataLst>
-      <p:tags r:id="rId1"/>
-    </p:custDataLst>
-  </p:cSld>
-  <p:clrMapOvr>
-    <a:masterClrMapping/>
-  </p:clrMapOvr>
+  <p:timing>
+    <p:tnLst>
+      <p:par>
+        <p:cTn id="1" dur="indefinite" restart="never" nodeType="tmRoot">
+          <p:childTnLst>
+            <p:seq concurrent="1" nextAc="seek">
+              <p:cTn id="2" dur="indefinite" nodeType="mainSeq">
+                <p:childTnLst>
+                  <p:par>
+                    <p:cTn id="3" fill="hold">
+                      <p:stCondLst>
+                        <p:cond delay="indefinite"/>
+                      </p:stCondLst>
+                      <p:childTnLst>
+                        <p:par>
+                          <p:cTn id="4" fill="hold">
+                            <p:stCondLst>
+                              <p:cond delay="0"/>
+                            </p:stCondLst>
+                            <p:childTnLst>
+                              <p:par>
+                                <p:cTn id="5" presetID="1" presetClass="entr" presetSubtype="0" fill="hold" nodeType="clickEffect">
+                                  <p:stCondLst>
+                                    <p:cond delay="0"/>
+                                  </p:stCondLst>
+                                  <p:childTnLst>
+                                    <p:set>
+                                      <p:cBhvr>
+                                        <p:cTn id="6" dur="1" fill="hold">
+                                          <p:stCondLst>
+                                            <p:cond delay="0"/>
+                                          </p:stCondLst>
+                                        </p:cTn>
+                                        <p:tgtEl>
+                                          <p:spTgt spid="6">
+                                            <p:txEl>
+                                              <p:pRg st="0" end="0"/>
+                                            </p:txEl>
+                                          </p:spTgt>
+                                        </p:tgtEl>
+                                        <p:attrNameLst>
+                                          <p:attrName>style.visibility</p:attrName>
+                                        </p:attrNameLst>
+                                      </p:cBhvr>
+                                      <p:to>
+                                        <p:strVal val="visible"/>
+                                      </p:to>
+                                    </p:set>
+                                  </p:childTnLst>
+                                </p:cTn>
+                              </p:par>
+                            </p:childTnLst>
+                          </p:cTn>
+                        </p:par>
+                      </p:childTnLst>
+                    </p:cTn>
+                  </p:par>
+                </p:childTnLst>
+              </p:cTn>
+              <p:prevCondLst>
+                <p:cond evt="onPrev" delay="0">
+                  <p:tgtEl>
+                    <p:sldTgt/>
+                  </p:tgtEl>
+                </p:cond>
+              </p:prevCondLst>
+              <p:nextCondLst>
+                <p:cond evt="onNext" delay="0">
+                  <p:tgtEl>
+                    <p:sldTgt/>
+                  </p:tgtEl>
+                </p:cond>
+              </p:nextCondLst>
+            </p:seq>
+          </p:childTnLst>
+        </p:cTn>
+      </p:par>
+    </p:tnLst>
+  </p:timing>
 </p:sld>
 </file>
 
@@ -19476,6 +21212,68 @@
             <a:r>
               <a:rPr lang="zh-CN" altLang="en-US" dirty="0"/>
               <a:t>任务：实现反向计算误差项</a:t>
+            </a:r>
+            <a:endParaRPr lang="en-US" altLang="zh-CN" dirty="0"/>
+          </a:p>
+          <a:p>
+            <a:pPr marL="285750" indent="-285750">
+              <a:buFont typeface="Arial" panose="020B0604020202020204" pitchFamily="34" charset="0"/>
+              <a:buChar char="•"/>
+            </a:pPr>
+            <a:r>
+              <a:rPr lang="zh-CN" altLang="en-US" dirty="0"/>
+              <a:t>主问题：如何计算</a:t>
+            </a:r>
+            <a:r>
+              <a:rPr kumimoji="1" lang="en-US" altLang="zh-CN" dirty="0">
+                <a:solidFill>
+                  <a:srgbClr val="333333"/>
+                </a:solidFill>
+                <a:latin typeface="verdana" panose="020B0604030504040204" pitchFamily="34" charset="0"/>
+              </a:rPr>
+              <a:t>Filter</a:t>
+            </a:r>
+            <a:r>
+              <a:rPr kumimoji="1" lang="zh-CN" altLang="en-US" dirty="0">
+                <a:solidFill>
+                  <a:srgbClr val="333333"/>
+                </a:solidFill>
+                <a:latin typeface="verdana" panose="020B0604030504040204" pitchFamily="34" charset="0"/>
+              </a:rPr>
+              <a:t>每个权重值的梯度</a:t>
+            </a:r>
+            <a:r>
+              <a:rPr lang="zh-CN" altLang="en-US" dirty="0"/>
+              <a:t>？</a:t>
+            </a:r>
+            <a:endParaRPr lang="en-US" altLang="zh-CN" dirty="0"/>
+          </a:p>
+          <a:p>
+            <a:pPr marL="285750" indent="-285750">
+              <a:buFont typeface="Arial" panose="020B0604020202020204" pitchFamily="34" charset="0"/>
+              <a:buChar char="•"/>
+            </a:pPr>
+            <a:r>
+              <a:rPr lang="zh-CN" altLang="en-US" dirty="0"/>
+              <a:t>任务：实现计算</a:t>
+            </a:r>
+            <a:r>
+              <a:rPr kumimoji="1" lang="en-US" altLang="zh-CN" dirty="0">
+                <a:solidFill>
+                  <a:srgbClr val="333333"/>
+                </a:solidFill>
+                <a:latin typeface="verdana" panose="020B0604030504040204" pitchFamily="34" charset="0"/>
+              </a:rPr>
+              <a:t>Filter</a:t>
+            </a:r>
+            <a:r>
+              <a:rPr kumimoji="1" lang="zh-CN" altLang="en-US" dirty="0">
+                <a:solidFill>
+                  <a:srgbClr val="333333"/>
+                </a:solidFill>
+                <a:latin typeface="verdana" panose="020B0604030504040204" pitchFamily="34" charset="0"/>
+              </a:rPr>
+              <a:t>每个权重值的梯度</a:t>
             </a:r>
             <a:br>
               <a:rPr lang="en-US" altLang="zh-CN" dirty="0"/>
@@ -19774,6 +21572,104 @@
                       </p:childTnLst>
                     </p:cTn>
                   </p:par>
+                  <p:par>
+                    <p:cTn id="23" fill="hold">
+                      <p:stCondLst>
+                        <p:cond delay="indefinite"/>
+                      </p:stCondLst>
+                      <p:childTnLst>
+                        <p:par>
+                          <p:cTn id="24" fill="hold">
+                            <p:stCondLst>
+                              <p:cond delay="0"/>
+                            </p:stCondLst>
+                            <p:childTnLst>
+                              <p:par>
+                                <p:cTn id="25" presetID="1" presetClass="entr" presetSubtype="0" fill="hold" grpId="0" nodeType="clickEffect">
+                                  <p:stCondLst>
+                                    <p:cond delay="0"/>
+                                  </p:stCondLst>
+                                  <p:childTnLst>
+                                    <p:set>
+                                      <p:cBhvr>
+                                        <p:cTn id="26" dur="1" fill="hold">
+                                          <p:stCondLst>
+                                            <p:cond delay="0"/>
+                                          </p:stCondLst>
+                                        </p:cTn>
+                                        <p:tgtEl>
+                                          <p:spTgt spid="2">
+                                            <p:txEl>
+                                              <p:pRg st="5" end="5"/>
+                                            </p:txEl>
+                                          </p:spTgt>
+                                        </p:tgtEl>
+                                        <p:attrNameLst>
+                                          <p:attrName>style.visibility</p:attrName>
+                                        </p:attrNameLst>
+                                      </p:cBhvr>
+                                      <p:to>
+                                        <p:strVal val="visible"/>
+                                      </p:to>
+                                    </p:set>
+                                  </p:childTnLst>
+                                </p:cTn>
+                              </p:par>
+                            </p:childTnLst>
+                          </p:cTn>
+                        </p:par>
+                      </p:childTnLst>
+                    </p:cTn>
+                  </p:par>
+                  <p:par>
+                    <p:cTn id="27" fill="hold">
+                      <p:stCondLst>
+                        <p:cond delay="indefinite"/>
+                      </p:stCondLst>
+                      <p:childTnLst>
+                        <p:par>
+                          <p:cTn id="28" fill="hold">
+                            <p:stCondLst>
+                              <p:cond delay="0"/>
+                            </p:stCondLst>
+                            <p:childTnLst>
+                              <p:par>
+                                <p:cTn id="29" presetID="1" presetClass="entr" presetSubtype="0" fill="hold" grpId="0" nodeType="clickEffect">
+                                  <p:stCondLst>
+                                    <p:cond delay="0"/>
+                                  </p:stCondLst>
+                                  <p:childTnLst>
+                                    <p:set>
+                                      <p:cBhvr>
+                                        <p:cTn id="30" dur="1" fill="hold">
+                                          <p:stCondLst>
+                                            <p:cond delay="0"/>
+                                          </p:stCondLst>
+                                        </p:cTn>
+                                        <p:tgtEl>
+                                          <p:spTgt spid="2">
+                                            <p:txEl>
+                                              <p:pRg st="6" end="6"/>
+                                            </p:txEl>
+                                          </p:spTgt>
+                                        </p:tgtEl>
+                                        <p:attrNameLst>
+                                          <p:attrName>style.visibility</p:attrName>
+                                        </p:attrNameLst>
+                                      </p:cBhvr>
+                                      <p:to>
+                                        <p:strVal val="visible"/>
+                                      </p:to>
+                                    </p:set>
+                                  </p:childTnLst>
+                                </p:cTn>
+                              </p:par>
+                            </p:childTnLst>
+                          </p:cTn>
+                        </p:par>
+                      </p:childTnLst>
+                    </p:cTn>
+                  </p:par>
                 </p:childTnLst>
               </p:cTn>
               <p:prevCondLst>
@@ -19803,6 +21699,56 @@
 </file>
 
 <file path=ppt/slides/slide30.xml><?xml version="1.0" encoding="utf-8"?>
+<p:sld xmlns:a="http://schemas.openxmlformats.org/drawingml/2006/main" xmlns:r="http://schemas.openxmlformats.org/officeDocument/2006/relationships" xmlns:p="http://schemas.openxmlformats.org/presentationml/2006/main">
+  <p:cSld>
+    <p:spTree>
+      <p:nvGrpSpPr>
+        <p:cNvPr id="1" name=""/>
+        <p:cNvGrpSpPr/>
+        <p:nvPr/>
+      </p:nvGrpSpPr>
+      <p:grpSpPr>
+        <a:xfrm>
+          <a:off x="0" y="0"/>
+          <a:ext cx="0" cy="0"/>
+          <a:chOff x="0" y="0"/>
+          <a:chExt cx="0" cy="0"/>
+        </a:xfrm>
+      </p:grpSpPr>
+      <p:sp>
+        <p:nvSpPr>
+          <p:cNvPr id="2" name="标题 1"/>
+          <p:cNvSpPr>
+            <a:spLocks noGrp="1"/>
+          </p:cNvSpPr>
+          <p:nvPr>
+            <p:ph type="title"/>
+          </p:nvPr>
+        </p:nvSpPr>
+        <p:spPr/>
+        <p:txBody>
+          <a:bodyPr/>
+          <a:lstStyle/>
+          <a:p>
+            <a:r>
+              <a:rPr lang="zh-CN" altLang="en-US"/>
+              <a:t>总结</a:t>
+            </a:r>
+          </a:p>
+        </p:txBody>
+      </p:sp>
+    </p:spTree>
+    <p:custDataLst>
+      <p:tags r:id="rId1"/>
+    </p:custDataLst>
+  </p:cSld>
+  <p:clrMapOvr>
+    <a:masterClrMapping/>
+  </p:clrMapOvr>
+</p:sld>
+</file>
+
+<file path=ppt/slides/slide31.xml><?xml version="1.0" encoding="utf-8"?>
 <p:sld xmlns:a="http://schemas.openxmlformats.org/drawingml/2006/main" xmlns:r="http://schemas.openxmlformats.org/officeDocument/2006/relationships" xmlns:p="http://schemas.openxmlformats.org/presentationml/2006/main">
   <p:cSld>
     <p:spTree>
@@ -20112,7 +22058,7 @@
 </p:sld>
 </file>
 
-<file path=ppt/slides/slide31.xml><?xml version="1.0" encoding="utf-8"?>
+<file path=ppt/slides/slide32.xml><?xml version="1.0" encoding="utf-8"?>
 <p:sld xmlns:a="http://schemas.openxmlformats.org/drawingml/2006/main" xmlns:r="http://schemas.openxmlformats.org/officeDocument/2006/relationships" xmlns:p="http://schemas.openxmlformats.org/presentationml/2006/main">
   <p:cSld>
     <p:spTree>
@@ -20359,7 +22305,7 @@
 </p:sld>
 </file>
 
-<file path=ppt/slides/slide32.xml><?xml version="1.0" encoding="utf-8"?>
+<file path=ppt/slides/slide33.xml><?xml version="1.0" encoding="utf-8"?>
 <p:sld xmlns:a="http://schemas.openxmlformats.org/drawingml/2006/main" xmlns:r="http://schemas.openxmlformats.org/officeDocument/2006/relationships" xmlns:p="http://schemas.openxmlformats.org/presentationml/2006/main">
   <p:cSld>
     <p:spTree>
@@ -20607,7 +22553,7 @@
 </p:sld>
 </file>
 
-<file path=ppt/slides/slide33.xml><?xml version="1.0" encoding="utf-8"?>
+<file path=ppt/slides/slide34.xml><?xml version="1.0" encoding="utf-8"?>
 <p:sld xmlns:a="http://schemas.openxmlformats.org/drawingml/2006/main" xmlns:r="http://schemas.openxmlformats.org/officeDocument/2006/relationships" xmlns:p="http://schemas.openxmlformats.org/presentationml/2006/main">
   <p:cSld>
     <p:spTree>
@@ -20644,10 +22590,20 @@
               <a:buChar char="•"/>
             </a:pPr>
             <a:r>
+              <a:rPr lang="zh-CN" altLang="en-US"/>
+              <a:t>最大池化</a:t>
+            </a:r>
+            <a:r>
+              <a:rPr lang="zh-CN" altLang="en-US">
+                <a:sym typeface="+mn-ea"/>
+              </a:rPr>
+              <a:t>层</a:t>
+            </a:r>
+            <a:r>
               <a:rPr lang="zh-CN" altLang="en-US" dirty="0">
                 <a:sym typeface="+mn-ea"/>
               </a:rPr>
-              <a:t>卷积层的后向传播推导</a:t>
+              <a:t>的后向传播推导</a:t>
             </a:r>
             <a:endParaRPr dirty="0">
               <a:sym typeface="+mn-ea"/>
@@ -20693,7 +22649,7 @@
 </p:sld>
 </file>
 
-<file path=ppt/slides/slide34.xml><?xml version="1.0" encoding="utf-8"?>
+<file path=ppt/slides/slide35.xml><?xml version="1.0" encoding="utf-8"?>
 <p:sld xmlns:a="http://schemas.openxmlformats.org/drawingml/2006/main" xmlns:r="http://schemas.openxmlformats.org/officeDocument/2006/relationships" xmlns:p="http://schemas.openxmlformats.org/presentationml/2006/main">
   <p:cSld>
     <p:spTree>
@@ -20721,7 +22677,7 @@
 </p:sld>
 </file>
 
-<file path=ppt/slides/slide35.xml><?xml version="1.0" encoding="utf-8"?>
+<file path=ppt/slides/slide36.xml><?xml version="1.0" encoding="utf-8"?>
 <p:sld xmlns:a="http://schemas.openxmlformats.org/drawingml/2006/main" xmlns:r="http://schemas.openxmlformats.org/officeDocument/2006/relationships" xmlns:p="http://schemas.openxmlformats.org/presentationml/2006/main">
   <p:cSld>
     <p:spTree>
@@ -20794,7 +22750,7 @@
 </p:sld>
 </file>
 
-<file path=ppt/slides/slide36.xml><?xml version="1.0" encoding="utf-8"?>
+<file path=ppt/slides/slide37.xml><?xml version="1.0" encoding="utf-8"?>
 <p:sld xmlns:a="http://schemas.openxmlformats.org/drawingml/2006/main" xmlns:r="http://schemas.openxmlformats.org/officeDocument/2006/relationships" xmlns:p="http://schemas.openxmlformats.org/presentationml/2006/main">
   <p:cSld>
     <p:spTree>
@@ -23087,6 +25043,15 @@
 </file>
 
 <file path=ppt/tags/tag105.xml><?xml version="1.0" encoding="utf-8"?>
+<p:tagLst xmlns:a="http://schemas.openxmlformats.org/drawingml/2006/main" xmlns:r="http://schemas.openxmlformats.org/officeDocument/2006/relationships" xmlns:p="http://schemas.openxmlformats.org/presentationml/2006/main">
+  <p:tag name="KSO_WM_BEAUTIFY_FLAG" val="#wm#"/>
+  <p:tag name="KSO_WM_TEMPLATE_CATEGORY" val="custom"/>
+  <p:tag name="KSO_WM_TEMPLATE_INDEX" val="20187308"/>
+  <p:tag name="KSO_WM_SPECIAL_SOURCE" val="bdnull"/>
+</p:tagLst>
+</file>
+
+<file path=ppt/tags/tag106.xml><?xml version="1.0" encoding="utf-8"?>
 <p:tagLst xmlns:a="http://schemas.openxmlformats.org/drawingml/2006/main" xmlns:r="http://schemas.openxmlformats.org/officeDocument/2006/relationships" xmlns:p="http://schemas.openxmlformats.org/presentationml/2006/main">
   <p:tag name="KSO_WM_BEAUTIFY_FLAG" val="#wm#"/>
   <p:tag name="KSO_WM_TEMPLATE_CATEGORY" val="custom"/>

</xml_diff>

<commit_message>
feat(11_max_pooling_layer_backward): add ppt and code
</commit_message>
<xml_diff>
--- a/lessons/10_conv_layer_backward/ppt/卷积层的后向传播推导.pptx
+++ b/lessons/10_conv_layer_backward/ppt/卷积层的后向传播推导.pptx
@@ -245,7 +245,7 @@
                 <a:latin typeface="微软雅黑" panose="020B0503020204020204" charset="-122"/>
                 <a:ea typeface="微软雅黑" panose="020B0503020204020204" charset="-122"/>
               </a:rPr>
-              <a:t>2022/12/27</a:t>
+              <a:t>2022/12/28</a:t>
             </a:fld>
             <a:endParaRPr lang="zh-CN" altLang="en-US">
               <a:latin typeface="微软雅黑" panose="020B0503020204020204" charset="-122"/>
@@ -428,7 +428,7 @@
           <a:p>
             <a:fld id="{1AC49D05-6128-4D0D-A32A-06A5E73B386C}" type="datetimeFigureOut">
               <a:rPr lang="zh-CN" altLang="en-US" smtClean="0"/>
-              <a:t>2022/12/27</a:t>
+              <a:t>2022/12/28</a:t>
             </a:fld>
             <a:endParaRPr lang="zh-CN" altLang="en-US"/>
           </a:p>
@@ -1090,7 +1090,7 @@
           <a:p>
             <a:fld id="{9EFD9D74-47D9-4702-A33C-335B63B48DBF}" type="datetimeFigureOut">
               <a:rPr lang="zh-CN" altLang="en-US" smtClean="0"/>
-              <a:t>2022/12/27</a:t>
+              <a:t>2022/12/28</a:t>
             </a:fld>
             <a:endParaRPr lang="zh-CN" altLang="en-US" dirty="0"/>
           </a:p>
@@ -1423,7 +1423,7 @@
           <a:p>
             <a:fld id="{760FBDFE-C587-4B4C-A407-44438C67B59E}" type="datetimeFigureOut">
               <a:rPr lang="zh-CN" altLang="en-US" smtClean="0"/>
-              <a:t>2022/12/27</a:t>
+              <a:t>2022/12/28</a:t>
             </a:fld>
             <a:endParaRPr lang="zh-CN" altLang="en-US"/>
           </a:p>
@@ -1596,7 +1596,7 @@
           <a:p>
             <a:fld id="{9EFD9D74-47D9-4702-A33C-335B63B48DBF}" type="datetimeFigureOut">
               <a:rPr lang="zh-CN" altLang="en-US" smtClean="0"/>
-              <a:t>2022/12/27</a:t>
+              <a:t>2022/12/28</a:t>
             </a:fld>
             <a:endParaRPr lang="zh-CN" altLang="en-US" dirty="0"/>
           </a:p>
@@ -2121,7 +2121,7 @@
           <a:p>
             <a:fld id="{760FBDFE-C587-4B4C-A407-44438C67B59E}" type="datetimeFigureOut">
               <a:rPr lang="zh-CN" altLang="en-US" smtClean="0"/>
-              <a:t>2022/12/27</a:t>
+              <a:t>2022/12/28</a:t>
             </a:fld>
             <a:endParaRPr lang="zh-CN" altLang="en-US"/>
           </a:p>
@@ -2869,7 +2869,7 @@
           <a:p>
             <a:fld id="{760FBDFE-C587-4B4C-A407-44438C67B59E}" type="datetimeFigureOut">
               <a:rPr lang="zh-CN" altLang="en-US" smtClean="0"/>
-              <a:t>2022/12/27</a:t>
+              <a:t>2022/12/28</a:t>
             </a:fld>
             <a:endParaRPr lang="zh-CN" altLang="en-US"/>
           </a:p>
@@ -3035,7 +3035,7 @@
           <a:p>
             <a:fld id="{760FBDFE-C587-4B4C-A407-44438C67B59E}" type="datetimeFigureOut">
               <a:rPr lang="zh-CN" altLang="en-US" smtClean="0"/>
-              <a:t>2022/12/27</a:t>
+              <a:t>2022/12/28</a:t>
             </a:fld>
             <a:endParaRPr lang="zh-CN" altLang="en-US"/>
           </a:p>
@@ -3149,7 +3149,7 @@
           <a:p>
             <a:fld id="{760FBDFE-C587-4B4C-A407-44438C67B59E}" type="datetimeFigureOut">
               <a:rPr lang="zh-CN" altLang="en-US" smtClean="0"/>
-              <a:t>2022/12/27</a:t>
+              <a:t>2022/12/28</a:t>
             </a:fld>
             <a:endParaRPr lang="zh-CN" altLang="en-US"/>
           </a:p>
@@ -3479,7 +3479,7 @@
           <a:p>
             <a:fld id="{9EFD9D74-47D9-4702-A33C-335B63B48DBF}" type="datetimeFigureOut">
               <a:rPr lang="zh-CN" altLang="en-US" smtClean="0"/>
-              <a:t>2022/12/27</a:t>
+              <a:t>2022/12/28</a:t>
             </a:fld>
             <a:endParaRPr lang="zh-CN" altLang="en-US" dirty="0"/>
           </a:p>
@@ -3992,7 +3992,7 @@
           <a:p>
             <a:fld id="{760FBDFE-C587-4B4C-A407-44438C67B59E}" type="datetimeFigureOut">
               <a:rPr lang="zh-CN" altLang="en-US" smtClean="0"/>
-              <a:t>2022/12/27</a:t>
+              <a:t>2022/12/28</a:t>
             </a:fld>
             <a:endParaRPr lang="zh-CN" altLang="en-US"/>
           </a:p>
@@ -4106,7 +4106,7 @@
           <a:p>
             <a:fld id="{760FBDFE-C587-4B4C-A407-44438C67B59E}" type="datetimeFigureOut">
               <a:rPr lang="zh-CN" altLang="en-US" smtClean="0"/>
-              <a:t>2022/12/27</a:t>
+              <a:t>2022/12/28</a:t>
             </a:fld>
             <a:endParaRPr lang="zh-CN" altLang="en-US"/>
           </a:p>
@@ -4394,7 +4394,7 @@
           <a:p>
             <a:fld id="{82F288E0-7875-42C4-84C8-98DBBD3BF4D2}" type="datetimeFigureOut">
               <a:rPr lang="zh-CN" altLang="en-US" smtClean="0"/>
-              <a:t>2022/12/27</a:t>
+              <a:t>2022/12/28</a:t>
             </a:fld>
             <a:endParaRPr lang="zh-CN" altLang="en-US"/>
           </a:p>
@@ -4853,7 +4853,7 @@
           <a:p>
             <a:fld id="{760FBDFE-C587-4B4C-A407-44438C67B59E}" type="datetimeFigureOut">
               <a:rPr lang="zh-CN" altLang="en-US" smtClean="0"/>
-              <a:t>2022/12/27</a:t>
+              <a:t>2022/12/28</a:t>
             </a:fld>
             <a:endParaRPr lang="zh-CN" altLang="en-US"/>
           </a:p>
@@ -5522,7 +5522,7 @@
           <a:p>
             <a:fld id="{9EFD9D74-47D9-4702-A33C-335B63B48DBF}" type="datetimeFigureOut">
               <a:rPr lang="zh-CN" altLang="en-US" smtClean="0"/>
-              <a:t>2022/12/27</a:t>
+              <a:t>2022/12/28</a:t>
             </a:fld>
             <a:endParaRPr lang="zh-CN" altLang="en-US" dirty="0"/>
           </a:p>
@@ -5670,7 +5670,7 @@
           <a:p>
             <a:fld id="{9EFD9D74-47D9-4702-A33C-335B63B48DBF}" type="datetimeFigureOut">
               <a:rPr lang="zh-CN" altLang="en-US" smtClean="0"/>
-              <a:t>2022/12/27</a:t>
+              <a:t>2022/12/28</a:t>
             </a:fld>
             <a:endParaRPr lang="zh-CN" altLang="en-US" dirty="0"/>
           </a:p>
@@ -10992,8 +10992,8 @@
           </a:extLst>
         </p:spPr>
       </p:pic>
-      <mc:AlternateContent xmlns:mc="http://schemas.openxmlformats.org/markup-compatibility/2006">
-        <mc:Choice xmlns:a14="http://schemas.microsoft.com/office/drawing/2010/main" Requires="a14">
+      <mc:AlternateContent xmlns:mc="http://schemas.openxmlformats.org/markup-compatibility/2006" xmlns:a14="http://schemas.microsoft.com/office/drawing/2010/main">
+        <mc:Choice Requires="a14">
           <p:sp>
             <p:nvSpPr>
               <p:cNvPr id="2" name="文本框 1">
@@ -11310,7 +11310,7 @@
             </p:txBody>
           </p:sp>
         </mc:Choice>
-        <mc:Fallback>
+        <mc:Fallback xmlns="">
           <p:sp>
             <p:nvSpPr>
               <p:cNvPr id="2" name="文本框 1">
@@ -15410,8 +15410,8 @@
           </a:p>
         </p:txBody>
       </p:sp>
-      <mc:AlternateContent xmlns:mc="http://schemas.openxmlformats.org/markup-compatibility/2006">
-        <mc:Choice xmlns:a14="http://schemas.microsoft.com/office/drawing/2010/main" Requires="a14">
+      <mc:AlternateContent xmlns:mc="http://schemas.openxmlformats.org/markup-compatibility/2006" xmlns:a14="http://schemas.microsoft.com/office/drawing/2010/main">
+        <mc:Choice Requires="a14">
           <p:sp>
             <p:nvSpPr>
               <p:cNvPr id="6" name="文本占位符 1">
@@ -15949,7 +15949,7 @@
             </p:txBody>
           </p:sp>
         </mc:Choice>
-        <mc:Fallback>
+        <mc:Fallback xmlns="">
           <p:sp>
             <p:nvSpPr>
               <p:cNvPr id="6" name="文本占位符 1">
@@ -16930,7 +16930,18 @@
                     <a:latin typeface="PingFang SC" panose="020B0400000000000000" pitchFamily="34" charset="-122"/>
                     <a:ea typeface="PingFang SC" panose="020B0400000000000000" pitchFamily="34" charset="-122"/>
                   </a:rPr>
-                  <a:t>规律是：</a:t>
+                  <a:t>规律是什么</a:t>
+                </a:r>
+                <a:r>
+                  <a:rPr lang="en-US" altLang="zh-CN" b="0" i="0">
+                    <a:solidFill>
+                      <a:srgbClr val="333333"/>
+                    </a:solidFill>
+                    <a:effectLst/>
+                    <a:latin typeface="PingFang SC" panose="020B0400000000000000" pitchFamily="34" charset="-122"/>
+                    <a:ea typeface="PingFang SC" panose="020B0400000000000000" pitchFamily="34" charset="-122"/>
+                  </a:rPr>
+                  <a:t>?</a:t>
                 </a:r>
                 <a:endParaRPr lang="en-US" altLang="zh-CN" dirty="0"/>
               </a:p>
@@ -17095,7 +17106,7 @@
         </p:blipFill>
         <p:spPr bwMode="auto">
           <a:xfrm>
-            <a:off x="7913644" y="1483807"/>
+            <a:off x="8218356" y="1256388"/>
             <a:ext cx="3608475" cy="1945193"/>
           </a:xfrm>
           <a:prstGeom prst="rect">
@@ -18785,8 +18796,8 @@
           </a:extLst>
         </p:spPr>
       </p:pic>
-      <mc:AlternateContent xmlns:mc="http://schemas.openxmlformats.org/markup-compatibility/2006">
-        <mc:Choice xmlns:a14="http://schemas.microsoft.com/office/drawing/2010/main" Requires="a14">
+      <mc:AlternateContent xmlns:mc="http://schemas.openxmlformats.org/markup-compatibility/2006" xmlns:a14="http://schemas.microsoft.com/office/drawing/2010/main">
+        <mc:Choice Requires="a14">
           <p:sp>
             <p:nvSpPr>
               <p:cNvPr id="4" name="文本框 3">
@@ -19037,7 +19048,7 @@
             </p:txBody>
           </p:sp>
         </mc:Choice>
-        <mc:Fallback>
+        <mc:Fallback xmlns="">
           <p:sp>
             <p:nvSpPr>
               <p:cNvPr id="4" name="文本框 3">

</xml_diff>